<commit_message>
added author, converted to pdf
</commit_message>
<xml_diff>
--- a/doc/ShotgridORM.pptx
+++ b/doc/ShotgridORM.pptx
@@ -105,6 +105,11 @@
       </a:defRPr>
     </a:lvl9pPr>
   </p:defaultTextStyle>
+  <p:extLst>
+    <p:ext uri="{EFAFB233-063F-42B5-8137-9DF3F51BA10A}">
+      <p15:sldGuideLst xmlns:p15="http://schemas.microsoft.com/office/powerpoint/2012/main"/>
+    </p:ext>
+  </p:extLst>
 </p:presentation>
 </file>
 
@@ -257,7 +262,7 @@
           <a:p>
             <a:fld id="{00BE8D59-02A0-432D-960C-C8D1F28C55FA}" type="datetimeFigureOut">
               <a:rPr lang="en-CA" smtClean="0"/>
-              <a:t>2023-11-05</a:t>
+              <a:t>2024-03-18</a:t>
             </a:fld>
             <a:endParaRPr lang="en-CA"/>
           </a:p>
@@ -457,7 +462,7 @@
           <a:p>
             <a:fld id="{00BE8D59-02A0-432D-960C-C8D1F28C55FA}" type="datetimeFigureOut">
               <a:rPr lang="en-CA" smtClean="0"/>
-              <a:t>2023-11-05</a:t>
+              <a:t>2024-03-18</a:t>
             </a:fld>
             <a:endParaRPr lang="en-CA"/>
           </a:p>
@@ -667,7 +672,7 @@
           <a:p>
             <a:fld id="{00BE8D59-02A0-432D-960C-C8D1F28C55FA}" type="datetimeFigureOut">
               <a:rPr lang="en-CA" smtClean="0"/>
-              <a:t>2023-11-05</a:t>
+              <a:t>2024-03-18</a:t>
             </a:fld>
             <a:endParaRPr lang="en-CA"/>
           </a:p>
@@ -867,7 +872,7 @@
           <a:p>
             <a:fld id="{00BE8D59-02A0-432D-960C-C8D1F28C55FA}" type="datetimeFigureOut">
               <a:rPr lang="en-CA" smtClean="0"/>
-              <a:t>2023-11-05</a:t>
+              <a:t>2024-03-18</a:t>
             </a:fld>
             <a:endParaRPr lang="en-CA"/>
           </a:p>
@@ -1143,7 +1148,7 @@
           <a:p>
             <a:fld id="{00BE8D59-02A0-432D-960C-C8D1F28C55FA}" type="datetimeFigureOut">
               <a:rPr lang="en-CA" smtClean="0"/>
-              <a:t>2023-11-05</a:t>
+              <a:t>2024-03-18</a:t>
             </a:fld>
             <a:endParaRPr lang="en-CA"/>
           </a:p>
@@ -1411,7 +1416,7 @@
           <a:p>
             <a:fld id="{00BE8D59-02A0-432D-960C-C8D1F28C55FA}" type="datetimeFigureOut">
               <a:rPr lang="en-CA" smtClean="0"/>
-              <a:t>2023-11-05</a:t>
+              <a:t>2024-03-18</a:t>
             </a:fld>
             <a:endParaRPr lang="en-CA"/>
           </a:p>
@@ -1826,7 +1831,7 @@
           <a:p>
             <a:fld id="{00BE8D59-02A0-432D-960C-C8D1F28C55FA}" type="datetimeFigureOut">
               <a:rPr lang="en-CA" smtClean="0"/>
-              <a:t>2023-11-05</a:t>
+              <a:t>2024-03-18</a:t>
             </a:fld>
             <a:endParaRPr lang="en-CA"/>
           </a:p>
@@ -1968,7 +1973,7 @@
           <a:p>
             <a:fld id="{00BE8D59-02A0-432D-960C-C8D1F28C55FA}" type="datetimeFigureOut">
               <a:rPr lang="en-CA" smtClean="0"/>
-              <a:t>2023-11-05</a:t>
+              <a:t>2024-03-18</a:t>
             </a:fld>
             <a:endParaRPr lang="en-CA"/>
           </a:p>
@@ -2081,7 +2086,7 @@
           <a:p>
             <a:fld id="{00BE8D59-02A0-432D-960C-C8D1F28C55FA}" type="datetimeFigureOut">
               <a:rPr lang="en-CA" smtClean="0"/>
-              <a:t>2023-11-05</a:t>
+              <a:t>2024-03-18</a:t>
             </a:fld>
             <a:endParaRPr lang="en-CA"/>
           </a:p>
@@ -2394,7 +2399,7 @@
           <a:p>
             <a:fld id="{00BE8D59-02A0-432D-960C-C8D1F28C55FA}" type="datetimeFigureOut">
               <a:rPr lang="en-CA" smtClean="0"/>
-              <a:t>2023-11-05</a:t>
+              <a:t>2024-03-18</a:t>
             </a:fld>
             <a:endParaRPr lang="en-CA"/>
           </a:p>
@@ -2683,7 +2688,7 @@
           <a:p>
             <a:fld id="{00BE8D59-02A0-432D-960C-C8D1F28C55FA}" type="datetimeFigureOut">
               <a:rPr lang="en-CA" smtClean="0"/>
-              <a:t>2023-11-05</a:t>
+              <a:t>2024-03-18</a:t>
             </a:fld>
             <a:endParaRPr lang="en-CA"/>
           </a:p>
@@ -2926,7 +2931,7 @@
           <a:p>
             <a:fld id="{00BE8D59-02A0-432D-960C-C8D1F28C55FA}" type="datetimeFigureOut">
               <a:rPr lang="en-CA" smtClean="0"/>
-              <a:t>2023-11-05</a:t>
+              <a:t>2024-03-18</a:t>
             </a:fld>
             <a:endParaRPr lang="en-CA"/>
           </a:p>
@@ -3405,6 +3410,18 @@
               <a:rPr lang="en-US" dirty="0"/>
               <a:t> Object Relational Model Management</a:t>
             </a:r>
+          </a:p>
+          <a:p>
+            <a:r>
+              <a:rPr lang="en-US" dirty="0"/>
+              <a:t>John E. Tran</a:t>
+            </a:r>
+          </a:p>
+          <a:p>
+            <a:r>
+              <a:rPr lang="en-US"/>
+              <a:t>2024</a:t>
+            </a:r>
             <a:endParaRPr lang="en-CA" dirty="0"/>
           </a:p>
         </p:txBody>

</xml_diff>

<commit_message>
boxed implemented system, added other systems
</commit_message>
<xml_diff>
--- a/doc/ShotgridORM.pptx
+++ b/doc/ShotgridORM.pptx
@@ -5,8 +5,7 @@
     <p:sldMasterId id="2147483648" r:id="rId1"/>
   </p:sldMasterIdLst>
   <p:sldIdLst>
-    <p:sldId id="256" r:id="rId2"/>
-    <p:sldId id="257" r:id="rId3"/>
+    <p:sldId id="257" r:id="rId2"/>
   </p:sldIdLst>
   <p:sldSz cx="12192000" cy="6858000"/>
   <p:notesSz cx="6858000" cy="9144000"/>
@@ -262,7 +261,7 @@
           <a:p>
             <a:fld id="{00BE8D59-02A0-432D-960C-C8D1F28C55FA}" type="datetimeFigureOut">
               <a:rPr lang="en-CA" smtClean="0"/>
-              <a:t>2024-03-18</a:t>
+              <a:t>2024-03-29</a:t>
             </a:fld>
             <a:endParaRPr lang="en-CA"/>
           </a:p>
@@ -462,7 +461,7 @@
           <a:p>
             <a:fld id="{00BE8D59-02A0-432D-960C-C8D1F28C55FA}" type="datetimeFigureOut">
               <a:rPr lang="en-CA" smtClean="0"/>
-              <a:t>2024-03-18</a:t>
+              <a:t>2024-03-29</a:t>
             </a:fld>
             <a:endParaRPr lang="en-CA"/>
           </a:p>
@@ -672,7 +671,7 @@
           <a:p>
             <a:fld id="{00BE8D59-02A0-432D-960C-C8D1F28C55FA}" type="datetimeFigureOut">
               <a:rPr lang="en-CA" smtClean="0"/>
-              <a:t>2024-03-18</a:t>
+              <a:t>2024-03-29</a:t>
             </a:fld>
             <a:endParaRPr lang="en-CA"/>
           </a:p>
@@ -872,7 +871,7 @@
           <a:p>
             <a:fld id="{00BE8D59-02A0-432D-960C-C8D1F28C55FA}" type="datetimeFigureOut">
               <a:rPr lang="en-CA" smtClean="0"/>
-              <a:t>2024-03-18</a:t>
+              <a:t>2024-03-29</a:t>
             </a:fld>
             <a:endParaRPr lang="en-CA"/>
           </a:p>
@@ -1148,7 +1147,7 @@
           <a:p>
             <a:fld id="{00BE8D59-02A0-432D-960C-C8D1F28C55FA}" type="datetimeFigureOut">
               <a:rPr lang="en-CA" smtClean="0"/>
-              <a:t>2024-03-18</a:t>
+              <a:t>2024-03-29</a:t>
             </a:fld>
             <a:endParaRPr lang="en-CA"/>
           </a:p>
@@ -1416,7 +1415,7 @@
           <a:p>
             <a:fld id="{00BE8D59-02A0-432D-960C-C8D1F28C55FA}" type="datetimeFigureOut">
               <a:rPr lang="en-CA" smtClean="0"/>
-              <a:t>2024-03-18</a:t>
+              <a:t>2024-03-29</a:t>
             </a:fld>
             <a:endParaRPr lang="en-CA"/>
           </a:p>
@@ -1831,7 +1830,7 @@
           <a:p>
             <a:fld id="{00BE8D59-02A0-432D-960C-C8D1F28C55FA}" type="datetimeFigureOut">
               <a:rPr lang="en-CA" smtClean="0"/>
-              <a:t>2024-03-18</a:t>
+              <a:t>2024-03-29</a:t>
             </a:fld>
             <a:endParaRPr lang="en-CA"/>
           </a:p>
@@ -1973,7 +1972,7 @@
           <a:p>
             <a:fld id="{00BE8D59-02A0-432D-960C-C8D1F28C55FA}" type="datetimeFigureOut">
               <a:rPr lang="en-CA" smtClean="0"/>
-              <a:t>2024-03-18</a:t>
+              <a:t>2024-03-29</a:t>
             </a:fld>
             <a:endParaRPr lang="en-CA"/>
           </a:p>
@@ -2086,7 +2085,7 @@
           <a:p>
             <a:fld id="{00BE8D59-02A0-432D-960C-C8D1F28C55FA}" type="datetimeFigureOut">
               <a:rPr lang="en-CA" smtClean="0"/>
-              <a:t>2024-03-18</a:t>
+              <a:t>2024-03-29</a:t>
             </a:fld>
             <a:endParaRPr lang="en-CA"/>
           </a:p>
@@ -2399,7 +2398,7 @@
           <a:p>
             <a:fld id="{00BE8D59-02A0-432D-960C-C8D1F28C55FA}" type="datetimeFigureOut">
               <a:rPr lang="en-CA" smtClean="0"/>
-              <a:t>2024-03-18</a:t>
+              <a:t>2024-03-29</a:t>
             </a:fld>
             <a:endParaRPr lang="en-CA"/>
           </a:p>
@@ -2688,7 +2687,7 @@
           <a:p>
             <a:fld id="{00BE8D59-02A0-432D-960C-C8D1F28C55FA}" type="datetimeFigureOut">
               <a:rPr lang="en-CA" smtClean="0"/>
-              <a:t>2024-03-18</a:t>
+              <a:t>2024-03-29</a:t>
             </a:fld>
             <a:endParaRPr lang="en-CA"/>
           </a:p>
@@ -2931,7 +2930,7 @@
           <a:p>
             <a:fld id="{00BE8D59-02A0-432D-960C-C8D1F28C55FA}" type="datetimeFigureOut">
               <a:rPr lang="en-CA" smtClean="0"/>
-              <a:t>2024-03-18</a:t>
+              <a:t>2024-03-29</a:t>
             </a:fld>
             <a:endParaRPr lang="en-CA"/>
           </a:p>
@@ -3350,114 +3349,6 @@
       </p:grpSpPr>
       <p:sp>
         <p:nvSpPr>
-          <p:cNvPr id="2" name="Title 1">
-            <a:extLst>
-              <a:ext uri="{FF2B5EF4-FFF2-40B4-BE49-F238E27FC236}">
-                <a16:creationId xmlns:a16="http://schemas.microsoft.com/office/drawing/2014/main" id="{E50F0A13-5098-B166-C4A2-FAFEBC21E320}"/>
-              </a:ext>
-            </a:extLst>
-          </p:cNvPr>
-          <p:cNvSpPr>
-            <a:spLocks noGrp="1"/>
-          </p:cNvSpPr>
-          <p:nvPr>
-            <p:ph type="ctrTitle"/>
-          </p:nvPr>
-        </p:nvSpPr>
-        <p:spPr/>
-        <p:txBody>
-          <a:bodyPr/>
-          <a:lstStyle/>
-          <a:p>
-            <a:r>
-              <a:rPr lang="en-US" dirty="0" err="1"/>
-              <a:t>Shotgrid</a:t>
-            </a:r>
-            <a:r>
-              <a:rPr lang="en-US" dirty="0"/>
-              <a:t> ORM</a:t>
-            </a:r>
-            <a:endParaRPr lang="en-CA" dirty="0"/>
-          </a:p>
-        </p:txBody>
-      </p:sp>
-      <p:sp>
-        <p:nvSpPr>
-          <p:cNvPr id="3" name="Subtitle 2">
-            <a:extLst>
-              <a:ext uri="{FF2B5EF4-FFF2-40B4-BE49-F238E27FC236}">
-                <a16:creationId xmlns:a16="http://schemas.microsoft.com/office/drawing/2014/main" id="{955275E0-496E-830B-16AC-AF8C7E5EB5F2}"/>
-              </a:ext>
-            </a:extLst>
-          </p:cNvPr>
-          <p:cNvSpPr>
-            <a:spLocks noGrp="1"/>
-          </p:cNvSpPr>
-          <p:nvPr>
-            <p:ph type="subTitle" idx="1"/>
-          </p:nvPr>
-        </p:nvSpPr>
-        <p:spPr/>
-        <p:txBody>
-          <a:bodyPr/>
-          <a:lstStyle/>
-          <a:p>
-            <a:r>
-              <a:rPr lang="en-US" dirty="0" err="1"/>
-              <a:t>Shotgrid</a:t>
-            </a:r>
-            <a:r>
-              <a:rPr lang="en-US" dirty="0"/>
-              <a:t> Object Relational Model Management</a:t>
-            </a:r>
-          </a:p>
-          <a:p>
-            <a:r>
-              <a:rPr lang="en-US" dirty="0"/>
-              <a:t>John E. Tran</a:t>
-            </a:r>
-          </a:p>
-          <a:p>
-            <a:r>
-              <a:rPr lang="en-US"/>
-              <a:t>2024</a:t>
-            </a:r>
-            <a:endParaRPr lang="en-CA" dirty="0"/>
-          </a:p>
-        </p:txBody>
-      </p:sp>
-    </p:spTree>
-    <p:extLst>
-      <p:ext uri="{BB962C8B-B14F-4D97-AF65-F5344CB8AC3E}">
-        <p14:creationId xmlns:p14="http://schemas.microsoft.com/office/powerpoint/2010/main" val="9376995"/>
-      </p:ext>
-    </p:extLst>
-  </p:cSld>
-  <p:clrMapOvr>
-    <a:masterClrMapping/>
-  </p:clrMapOvr>
-</p:sld>
-</file>
-
-<file path=ppt/slides/slide2.xml><?xml version="1.0" encoding="utf-8"?>
-<p:sld xmlns:a="http://schemas.openxmlformats.org/drawingml/2006/main" xmlns:r="http://schemas.openxmlformats.org/officeDocument/2006/relationships" xmlns:p="http://schemas.openxmlformats.org/presentationml/2006/main">
-  <p:cSld>
-    <p:spTree>
-      <p:nvGrpSpPr>
-        <p:cNvPr id="1" name=""/>
-        <p:cNvGrpSpPr/>
-        <p:nvPr/>
-      </p:nvGrpSpPr>
-      <p:grpSpPr>
-        <a:xfrm>
-          <a:off x="0" y="0"/>
-          <a:ext cx="0" cy="0"/>
-          <a:chOff x="0" y="0"/>
-          <a:chExt cx="0" cy="0"/>
-        </a:xfrm>
-      </p:grpSpPr>
-      <p:sp>
-        <p:nvSpPr>
           <p:cNvPr id="2" name="Rectangle 1">
             <a:extLst>
               <a:ext uri="{FF2B5EF4-FFF2-40B4-BE49-F238E27FC236}">
@@ -3470,8 +3361,8 @@
         </p:nvSpPr>
         <p:spPr>
           <a:xfrm>
-            <a:off x="2039164" y="584542"/>
-            <a:ext cx="2050093" cy="471813"/>
+            <a:off x="2030858" y="537167"/>
+            <a:ext cx="2050093" cy="531253"/>
           </a:xfrm>
           <a:prstGeom prst="rect">
             <a:avLst/>
@@ -3577,9 +3468,9 @@
           <p:nvPr/>
         </p:nvCxnSpPr>
         <p:spPr>
-          <a:xfrm flipH="1">
-            <a:off x="3056809" y="1056355"/>
-            <a:ext cx="7402" cy="1262970"/>
+          <a:xfrm>
+            <a:off x="3055905" y="1068420"/>
+            <a:ext cx="904" cy="1250905"/>
           </a:xfrm>
           <a:prstGeom prst="straightConnector1">
             <a:avLst/>
@@ -3717,8 +3608,8 @@
         </p:nvCxnSpPr>
         <p:spPr>
           <a:xfrm rot="16200000" flipH="1">
-            <a:off x="3485170" y="635396"/>
-            <a:ext cx="623081" cy="1464998"/>
+            <a:off x="3487049" y="637276"/>
+            <a:ext cx="611016" cy="1473304"/>
           </a:xfrm>
           <a:prstGeom prst="bentConnector3">
             <a:avLst>
@@ -4941,27 +4832,25 @@
         </p:nvSpPr>
         <p:spPr>
           <a:xfrm>
-            <a:off x="6973732" y="1631759"/>
-            <a:ext cx="1719212" cy="396240"/>
+            <a:off x="8749758" y="584971"/>
+            <a:ext cx="1719212" cy="435643"/>
           </a:xfrm>
           <a:prstGeom prst="flowChartPredefinedProcess">
             <a:avLst/>
           </a:prstGeom>
         </p:spPr>
         <p:style>
-          <a:lnRef idx="2">
-            <a:schemeClr val="accent1">
-              <a:shade val="15000"/>
-            </a:schemeClr>
+          <a:lnRef idx="1">
+            <a:schemeClr val="accent5"/>
           </a:lnRef>
-          <a:fillRef idx="1">
-            <a:schemeClr val="accent1"/>
+          <a:fillRef idx="2">
+            <a:schemeClr val="accent5"/>
           </a:fillRef>
-          <a:effectRef idx="0">
-            <a:schemeClr val="accent1"/>
+          <a:effectRef idx="1">
+            <a:schemeClr val="accent5"/>
           </a:effectRef>
           <a:fontRef idx="minor">
-            <a:schemeClr val="lt1"/>
+            <a:schemeClr val="dk1"/>
           </a:fontRef>
         </p:style>
         <p:txBody>
@@ -4987,18 +4876,21 @@
             </a:extLst>
           </p:cNvPr>
           <p:cNvCxnSpPr>
+            <a:cxnSpLocks/>
             <a:stCxn id="2" idx="3"/>
-            <a:endCxn id="147" idx="0"/>
+            <a:endCxn id="147" idx="1"/>
           </p:cNvCxnSpPr>
           <p:nvPr/>
         </p:nvCxnSpPr>
         <p:spPr>
-          <a:xfrm>
-            <a:off x="4089257" y="820449"/>
-            <a:ext cx="3744081" cy="811310"/>
-          </a:xfrm>
-          <a:prstGeom prst="bentConnector2">
-            <a:avLst/>
+          <a:xfrm flipV="1">
+            <a:off x="4080951" y="802793"/>
+            <a:ext cx="4668807" cy="1"/>
+          </a:xfrm>
+          <a:prstGeom prst="bentConnector3">
+            <a:avLst>
+              <a:gd name="adj1" fmla="val 50000"/>
+            </a:avLst>
           </a:prstGeom>
           <a:ln>
             <a:tailEnd type="triangle"/>
@@ -5036,9 +4928,9 @@
           <p:nvPr/>
         </p:nvCxnSpPr>
         <p:spPr>
-          <a:xfrm flipH="1">
-            <a:off x="7833337" y="2027999"/>
-            <a:ext cx="1" cy="233106"/>
+          <a:xfrm>
+            <a:off x="9609364" y="1020614"/>
+            <a:ext cx="0" cy="221407"/>
           </a:xfrm>
           <a:prstGeom prst="straightConnector1">
             <a:avLst/>
@@ -5250,19 +5142,16 @@
           <p:cNvCxnSpPr>
             <a:cxnSpLocks/>
             <a:stCxn id="263" idx="3"/>
-            <a:endCxn id="140" idx="4"/>
           </p:cNvCxnSpPr>
           <p:nvPr/>
         </p:nvCxnSpPr>
         <p:spPr>
           <a:xfrm flipV="1">
-            <a:off x="7331058" y="4255729"/>
-            <a:ext cx="798271" cy="1491864"/>
-          </a:xfrm>
-          <a:prstGeom prst="bentConnector3">
-            <a:avLst>
-              <a:gd name="adj1" fmla="val 128637"/>
-            </a:avLst>
+            <a:off x="7331058" y="4644236"/>
+            <a:ext cx="496808" cy="1103357"/>
+          </a:xfrm>
+          <a:prstGeom prst="bentConnector2">
+            <a:avLst/>
           </a:prstGeom>
           <a:ln>
             <a:tailEnd type="triangle"/>
@@ -5531,27 +5420,25 @@
         </p:nvSpPr>
         <p:spPr>
           <a:xfrm>
-            <a:off x="9183974" y="3701695"/>
-            <a:ext cx="1487548" cy="396240"/>
+            <a:off x="9144529" y="3031244"/>
+            <a:ext cx="1350078" cy="381930"/>
           </a:xfrm>
           <a:prstGeom prst="flowChartPredefinedProcess">
             <a:avLst/>
           </a:prstGeom>
         </p:spPr>
         <p:style>
-          <a:lnRef idx="2">
-            <a:schemeClr val="accent1">
-              <a:shade val="15000"/>
-            </a:schemeClr>
+          <a:lnRef idx="1">
+            <a:schemeClr val="accent1"/>
           </a:lnRef>
-          <a:fillRef idx="1">
+          <a:fillRef idx="2">
             <a:schemeClr val="accent1"/>
           </a:fillRef>
-          <a:effectRef idx="0">
+          <a:effectRef idx="1">
             <a:schemeClr val="accent1"/>
           </a:effectRef>
           <a:fontRef idx="minor">
-            <a:schemeClr val="lt1"/>
+            <a:schemeClr val="dk1"/>
           </a:fontRef>
         </p:style>
         <p:txBody>
@@ -5585,27 +5472,25 @@
         </p:nvSpPr>
         <p:spPr>
           <a:xfrm>
-            <a:off x="9183974" y="4334550"/>
-            <a:ext cx="1487548" cy="396240"/>
+            <a:off x="9144529" y="3515662"/>
+            <a:ext cx="1350078" cy="381930"/>
           </a:xfrm>
           <a:prstGeom prst="flowChartPredefinedProcess">
             <a:avLst/>
           </a:prstGeom>
         </p:spPr>
         <p:style>
-          <a:lnRef idx="2">
-            <a:schemeClr val="accent1">
-              <a:shade val="15000"/>
-            </a:schemeClr>
+          <a:lnRef idx="1">
+            <a:schemeClr val="accent1"/>
           </a:lnRef>
-          <a:fillRef idx="1">
+          <a:fillRef idx="2">
             <a:schemeClr val="accent1"/>
           </a:fillRef>
-          <a:effectRef idx="0">
+          <a:effectRef idx="1">
             <a:schemeClr val="accent1"/>
           </a:effectRef>
           <a:fontRef idx="minor">
-            <a:schemeClr val="lt1"/>
+            <a:schemeClr val="dk1"/>
           </a:fontRef>
         </p:style>
         <p:txBody>
@@ -5625,52 +5510,6 @@
           </a:p>
         </p:txBody>
       </p:sp>
-      <p:cxnSp>
-        <p:nvCxnSpPr>
-          <p:cNvPr id="243" name="Connector: Elbow 242">
-            <a:extLst>
-              <a:ext uri="{FF2B5EF4-FFF2-40B4-BE49-F238E27FC236}">
-                <a16:creationId xmlns:a16="http://schemas.microsoft.com/office/drawing/2014/main" id="{EB6147B0-0591-65DC-9F26-A12D00AA60DA}"/>
-              </a:ext>
-            </a:extLst>
-          </p:cNvPr>
-          <p:cNvCxnSpPr>
-            <a:cxnSpLocks/>
-            <a:stCxn id="140" idx="0"/>
-            <a:endCxn id="240" idx="1"/>
-          </p:cNvCxnSpPr>
-          <p:nvPr/>
-        </p:nvCxnSpPr>
-        <p:spPr>
-          <a:xfrm rot="5400000" flipH="1" flipV="1">
-            <a:off x="8393268" y="3339886"/>
-            <a:ext cx="230777" cy="1350636"/>
-          </a:xfrm>
-          <a:prstGeom prst="bentConnector4">
-            <a:avLst>
-              <a:gd name="adj1" fmla="val 99057"/>
-              <a:gd name="adj2" fmla="val 60957"/>
-            </a:avLst>
-          </a:prstGeom>
-          <a:ln>
-            <a:tailEnd type="triangle"/>
-          </a:ln>
-        </p:spPr>
-        <p:style>
-          <a:lnRef idx="1">
-            <a:schemeClr val="accent1"/>
-          </a:lnRef>
-          <a:fillRef idx="0">
-            <a:schemeClr val="accent1"/>
-          </a:fillRef>
-          <a:effectRef idx="0">
-            <a:schemeClr val="accent1"/>
-          </a:effectRef>
-          <a:fontRef idx="minor">
-            <a:schemeClr val="tx1"/>
-          </a:fontRef>
-        </p:style>
-      </p:cxnSp>
       <p:cxnSp>
         <p:nvCxnSpPr>
           <p:cNvPr id="247" name="Connector: Elbow 246">
@@ -5682,17 +5521,20 @@
           </p:cNvPr>
           <p:cNvCxnSpPr>
             <a:cxnSpLocks/>
+            <a:stCxn id="140" idx="4"/>
             <a:endCxn id="241" idx="1"/>
           </p:cNvCxnSpPr>
           <p:nvPr/>
         </p:nvCxnSpPr>
         <p:spPr>
-          <a:xfrm>
-            <a:off x="8028749" y="3899815"/>
-            <a:ext cx="1155225" cy="632855"/>
+          <a:xfrm flipV="1">
+            <a:off x="8129329" y="3706627"/>
+            <a:ext cx="1015200" cy="549102"/>
           </a:xfrm>
           <a:prstGeom prst="bentConnector3">
-            <a:avLst/>
+            <a:avLst>
+              <a:gd name="adj1" fmla="val 50000"/>
+            </a:avLst>
           </a:prstGeom>
           <a:ln>
             <a:tailEnd type="triangle"/>
@@ -5913,12 +5755,269 @@
         </p:nvSpPr>
         <p:spPr>
           <a:xfrm>
-            <a:off x="7275711" y="2261105"/>
-            <a:ext cx="1115251" cy="306562"/>
+            <a:off x="9051738" y="1242021"/>
+            <a:ext cx="1115251" cy="303002"/>
           </a:xfrm>
           <a:prstGeom prst="flowChartProcess">
             <a:avLst/>
           </a:prstGeom>
+        </p:spPr>
+        <p:style>
+          <a:lnRef idx="1">
+            <a:schemeClr val="accent5"/>
+          </a:lnRef>
+          <a:fillRef idx="2">
+            <a:schemeClr val="accent5"/>
+          </a:fillRef>
+          <a:effectRef idx="1">
+            <a:schemeClr val="accent5"/>
+          </a:effectRef>
+          <a:fontRef idx="minor">
+            <a:schemeClr val="dk1"/>
+          </a:fontRef>
+        </p:style>
+        <p:txBody>
+          <a:bodyPr rtlCol="0" anchor="ctr"/>
+          <a:lstStyle/>
+          <a:p>
+            <a:pPr algn="ctr"/>
+            <a:r>
+              <a:rPr lang="en-US" sz="1000" dirty="0"/>
+              <a:t>SGORM Plugin</a:t>
+            </a:r>
+            <a:endParaRPr lang="en-CA" sz="1000" dirty="0"/>
+          </a:p>
+        </p:txBody>
+      </p:sp>
+      <p:pic>
+        <p:nvPicPr>
+          <p:cNvPr id="293" name="Picture 292" descr="Fuel gauge">
+            <a:extLst>
+              <a:ext uri="{FF2B5EF4-FFF2-40B4-BE49-F238E27FC236}">
+                <a16:creationId xmlns:a16="http://schemas.microsoft.com/office/drawing/2014/main" id="{DE3C188E-6661-BC35-BC06-8A91776ADA99}"/>
+              </a:ext>
+            </a:extLst>
+          </p:cNvPr>
+          <p:cNvPicPr>
+            <a:picLocks noChangeAspect="1"/>
+          </p:cNvPicPr>
+          <p:nvPr/>
+        </p:nvPicPr>
+        <p:blipFill>
+          <a:blip r:embed="rId2">
+            <a:extLst>
+              <a:ext uri="{28A0092B-C50C-407E-A947-70E740481C1C}">
+                <a14:useLocalDpi xmlns:a14="http://schemas.microsoft.com/office/drawing/2010/main" val="0"/>
+              </a:ext>
+            </a:extLst>
+          </a:blip>
+          <a:stretch>
+            <a:fillRect/>
+          </a:stretch>
+        </p:blipFill>
+        <p:spPr>
+          <a:xfrm>
+            <a:off x="10731480" y="2865409"/>
+            <a:ext cx="1431894" cy="1003318"/>
+          </a:xfrm>
+          <a:prstGeom prst="rect">
+            <a:avLst/>
+          </a:prstGeom>
+        </p:spPr>
+      </p:pic>
+      <p:sp>
+        <p:nvSpPr>
+          <p:cNvPr id="298" name="TextBox 297">
+            <a:extLst>
+              <a:ext uri="{FF2B5EF4-FFF2-40B4-BE49-F238E27FC236}">
+                <a16:creationId xmlns:a16="http://schemas.microsoft.com/office/drawing/2014/main" id="{9BACA8D4-561F-5761-2873-CA5927490398}"/>
+              </a:ext>
+            </a:extLst>
+          </p:cNvPr>
+          <p:cNvSpPr txBox="1"/>
+          <p:nvPr/>
+        </p:nvSpPr>
+        <p:spPr>
+          <a:xfrm>
+            <a:off x="10899491" y="2852145"/>
+            <a:ext cx="1074256" cy="307777"/>
+          </a:xfrm>
+          <a:prstGeom prst="rect">
+            <a:avLst/>
+          </a:prstGeom>
+          <a:noFill/>
+        </p:spPr>
+        <p:txBody>
+          <a:bodyPr wrap="square" rtlCol="0">
+            <a:spAutoFit/>
+          </a:bodyPr>
+          <a:lstStyle/>
+          <a:p>
+            <a:r>
+              <a:rPr lang="en-US" sz="1400" dirty="0">
+                <a:solidFill>
+                  <a:schemeClr val="bg1"/>
+                </a:solidFill>
+              </a:rPr>
+              <a:t>Dashboards</a:t>
+            </a:r>
+            <a:endParaRPr lang="en-CA" sz="1400" dirty="0">
+              <a:solidFill>
+                <a:schemeClr val="bg1"/>
+              </a:solidFill>
+            </a:endParaRPr>
+          </a:p>
+        </p:txBody>
+      </p:sp>
+      <p:pic>
+        <p:nvPicPr>
+          <p:cNvPr id="302" name="Picture 301" descr="Magnifying glass showing decling performance">
+            <a:extLst>
+              <a:ext uri="{FF2B5EF4-FFF2-40B4-BE49-F238E27FC236}">
+                <a16:creationId xmlns:a16="http://schemas.microsoft.com/office/drawing/2014/main" id="{AECCE46A-B5F8-0A79-3530-AF82D798BA9D}"/>
+              </a:ext>
+            </a:extLst>
+          </p:cNvPr>
+          <p:cNvPicPr>
+            <a:picLocks noChangeAspect="1"/>
+          </p:cNvPicPr>
+          <p:nvPr/>
+        </p:nvPicPr>
+        <p:blipFill>
+          <a:blip r:embed="rId3">
+            <a:extLst>
+              <a:ext uri="{28A0092B-C50C-407E-A947-70E740481C1C}">
+                <a14:useLocalDpi xmlns:a14="http://schemas.microsoft.com/office/drawing/2010/main" val="0"/>
+              </a:ext>
+            </a:extLst>
+          </a:blip>
+          <a:stretch>
+            <a:fillRect/>
+          </a:stretch>
+        </p:blipFill>
+        <p:spPr>
+          <a:xfrm>
+            <a:off x="10728147" y="4064898"/>
+            <a:ext cx="1424062" cy="976188"/>
+          </a:xfrm>
+          <a:prstGeom prst="rect">
+            <a:avLst/>
+          </a:prstGeom>
+        </p:spPr>
+      </p:pic>
+      <p:sp>
+        <p:nvSpPr>
+          <p:cNvPr id="307" name="TextBox 306">
+            <a:extLst>
+              <a:ext uri="{FF2B5EF4-FFF2-40B4-BE49-F238E27FC236}">
+                <a16:creationId xmlns:a16="http://schemas.microsoft.com/office/drawing/2014/main" id="{EFC59380-0C41-A067-018B-37D86DCEA9A8}"/>
+              </a:ext>
+            </a:extLst>
+          </p:cNvPr>
+          <p:cNvSpPr txBox="1"/>
+          <p:nvPr/>
+        </p:nvSpPr>
+        <p:spPr>
+          <a:xfrm>
+            <a:off x="10692335" y="4798858"/>
+            <a:ext cx="1074256" cy="307777"/>
+          </a:xfrm>
+          <a:prstGeom prst="rect">
+            <a:avLst/>
+          </a:prstGeom>
+          <a:noFill/>
+        </p:spPr>
+        <p:txBody>
+          <a:bodyPr wrap="square" rtlCol="0">
+            <a:spAutoFit/>
+          </a:bodyPr>
+          <a:lstStyle/>
+          <a:p>
+            <a:r>
+              <a:rPr lang="en-US" sz="1400" dirty="0">
+                <a:solidFill>
+                  <a:schemeClr val="bg1"/>
+                </a:solidFill>
+              </a:rPr>
+              <a:t>Reports</a:t>
+            </a:r>
+            <a:endParaRPr lang="en-CA" sz="1400" dirty="0">
+              <a:solidFill>
+                <a:schemeClr val="bg1"/>
+              </a:solidFill>
+            </a:endParaRPr>
+          </a:p>
+        </p:txBody>
+      </p:sp>
+      <p:cxnSp>
+        <p:nvCxnSpPr>
+          <p:cNvPr id="37" name="Connector: Elbow 36">
+            <a:extLst>
+              <a:ext uri="{FF2B5EF4-FFF2-40B4-BE49-F238E27FC236}">
+                <a16:creationId xmlns:a16="http://schemas.microsoft.com/office/drawing/2014/main" id="{2D6961E5-5999-84B4-84F1-09AD653590E6}"/>
+              </a:ext>
+            </a:extLst>
+          </p:cNvPr>
+          <p:cNvCxnSpPr>
+            <a:stCxn id="286" idx="1"/>
+            <a:endCxn id="74" idx="0"/>
+          </p:cNvCxnSpPr>
+          <p:nvPr/>
+        </p:nvCxnSpPr>
+        <p:spPr>
+          <a:xfrm rot="10800000" flipV="1">
+            <a:off x="7833338" y="1393522"/>
+            <a:ext cx="1218400" cy="1814168"/>
+          </a:xfrm>
+          <a:prstGeom prst="bentConnector2">
+            <a:avLst/>
+          </a:prstGeom>
+          <a:ln>
+            <a:headEnd type="triangle" w="med" len="med"/>
+            <a:tailEnd type="triangle" w="med" len="med"/>
+          </a:ln>
+        </p:spPr>
+        <p:style>
+          <a:lnRef idx="1">
+            <a:schemeClr val="accent1"/>
+          </a:lnRef>
+          <a:fillRef idx="0">
+            <a:schemeClr val="accent1"/>
+          </a:fillRef>
+          <a:effectRef idx="0">
+            <a:schemeClr val="accent1"/>
+          </a:effectRef>
+          <a:fontRef idx="minor">
+            <a:schemeClr val="tx1"/>
+          </a:fontRef>
+        </p:style>
+      </p:cxnSp>
+      <p:sp>
+        <p:nvSpPr>
+          <p:cNvPr id="39" name="Rectangle 38">
+            <a:extLst>
+              <a:ext uri="{FF2B5EF4-FFF2-40B4-BE49-F238E27FC236}">
+                <a16:creationId xmlns:a16="http://schemas.microsoft.com/office/drawing/2014/main" id="{3DCC16F3-01AC-21EA-C02A-7BD0F2A31F3E}"/>
+              </a:ext>
+            </a:extLst>
+          </p:cNvPr>
+          <p:cNvSpPr/>
+          <p:nvPr/>
+        </p:nvSpPr>
+        <p:spPr>
+          <a:xfrm>
+            <a:off x="200859" y="248421"/>
+            <a:ext cx="8273704" cy="5930386"/>
+          </a:xfrm>
+          <a:prstGeom prst="rect">
+            <a:avLst/>
+          </a:prstGeom>
+          <a:noFill/>
+          <a:ln w="28575">
+            <a:solidFill>
+              <a:srgbClr val="0070C0"/>
+            </a:solidFill>
+          </a:ln>
         </p:spPr>
         <p:style>
           <a:lnRef idx="2">
@@ -5941,114 +6040,174 @@
           <a:lstStyle/>
           <a:p>
             <a:pPr algn="ctr"/>
-            <a:r>
-              <a:rPr lang="en-US" sz="1000" dirty="0"/>
-              <a:t>SGORM Plugin</a:t>
-            </a:r>
-            <a:endParaRPr lang="en-CA" sz="1000" dirty="0"/>
+            <a:endParaRPr lang="en-CA"/>
+          </a:p>
+        </p:txBody>
+      </p:sp>
+      <p:sp>
+        <p:nvSpPr>
+          <p:cNvPr id="94" name="Flowchart: Predefined Process 93">
+            <a:extLst>
+              <a:ext uri="{FF2B5EF4-FFF2-40B4-BE49-F238E27FC236}">
+                <a16:creationId xmlns:a16="http://schemas.microsoft.com/office/drawing/2014/main" id="{10E5D4A1-8A8B-310B-3BA9-E118ED1D8F83}"/>
+              </a:ext>
+            </a:extLst>
+          </p:cNvPr>
+          <p:cNvSpPr/>
+          <p:nvPr/>
+        </p:nvSpPr>
+        <p:spPr>
+          <a:xfrm>
+            <a:off x="9144529" y="3978881"/>
+            <a:ext cx="1350078" cy="237225"/>
+          </a:xfrm>
+          <a:prstGeom prst="flowChartPredefinedProcess">
+            <a:avLst/>
+          </a:prstGeom>
+        </p:spPr>
+        <p:style>
+          <a:lnRef idx="1">
+            <a:schemeClr val="accent1"/>
+          </a:lnRef>
+          <a:fillRef idx="2">
+            <a:schemeClr val="accent1"/>
+          </a:fillRef>
+          <a:effectRef idx="1">
+            <a:schemeClr val="accent1"/>
+          </a:effectRef>
+          <a:fontRef idx="minor">
+            <a:schemeClr val="dk1"/>
+          </a:fontRef>
+        </p:style>
+        <p:txBody>
+          <a:bodyPr rtlCol="0" anchor="ctr"/>
+          <a:lstStyle/>
+          <a:p>
+            <a:pPr algn="ctr"/>
+            <a:r>
+              <a:rPr lang="en-US" sz="1200" dirty="0"/>
+              <a:t>Tableau</a:t>
+            </a:r>
+            <a:endParaRPr lang="en-CA" sz="1200" dirty="0"/>
+          </a:p>
+        </p:txBody>
+      </p:sp>
+      <p:sp>
+        <p:nvSpPr>
+          <p:cNvPr id="95" name="Flowchart: Predefined Process 94">
+            <a:extLst>
+              <a:ext uri="{FF2B5EF4-FFF2-40B4-BE49-F238E27FC236}">
+                <a16:creationId xmlns:a16="http://schemas.microsoft.com/office/drawing/2014/main" id="{A6A2CC95-7D65-7AD4-BF1D-81A7C46EDA97}"/>
+              </a:ext>
+            </a:extLst>
+          </p:cNvPr>
+          <p:cNvSpPr/>
+          <p:nvPr/>
+        </p:nvSpPr>
+        <p:spPr>
+          <a:xfrm>
+            <a:off x="9144529" y="4288458"/>
+            <a:ext cx="1350078" cy="237225"/>
+          </a:xfrm>
+          <a:prstGeom prst="flowChartPredefinedProcess">
+            <a:avLst/>
+          </a:prstGeom>
+        </p:spPr>
+        <p:style>
+          <a:lnRef idx="1">
+            <a:schemeClr val="accent1"/>
+          </a:lnRef>
+          <a:fillRef idx="2">
+            <a:schemeClr val="accent1"/>
+          </a:fillRef>
+          <a:effectRef idx="1">
+            <a:schemeClr val="accent1"/>
+          </a:effectRef>
+          <a:fontRef idx="minor">
+            <a:schemeClr val="dk1"/>
+          </a:fontRef>
+        </p:style>
+        <p:txBody>
+          <a:bodyPr rtlCol="0" anchor="ctr"/>
+          <a:lstStyle/>
+          <a:p>
+            <a:pPr algn="ctr"/>
+            <a:r>
+              <a:rPr lang="en-US" sz="1200" dirty="0"/>
+              <a:t>Looker</a:t>
+            </a:r>
+            <a:endParaRPr lang="en-CA" sz="1200" dirty="0"/>
+          </a:p>
+        </p:txBody>
+      </p:sp>
+      <p:sp>
+        <p:nvSpPr>
+          <p:cNvPr id="104" name="Flowchart: Predefined Process 103">
+            <a:extLst>
+              <a:ext uri="{FF2B5EF4-FFF2-40B4-BE49-F238E27FC236}">
+                <a16:creationId xmlns:a16="http://schemas.microsoft.com/office/drawing/2014/main" id="{E8811CBD-D57D-0658-42BC-757C424AFDEE}"/>
+              </a:ext>
+            </a:extLst>
+          </p:cNvPr>
+          <p:cNvSpPr/>
+          <p:nvPr/>
+        </p:nvSpPr>
+        <p:spPr>
+          <a:xfrm>
+            <a:off x="9141196" y="4626249"/>
+            <a:ext cx="1350078" cy="237225"/>
+          </a:xfrm>
+          <a:prstGeom prst="flowChartPredefinedProcess">
+            <a:avLst/>
+          </a:prstGeom>
+        </p:spPr>
+        <p:style>
+          <a:lnRef idx="1">
+            <a:schemeClr val="accent1"/>
+          </a:lnRef>
+          <a:fillRef idx="2">
+            <a:schemeClr val="accent1"/>
+          </a:fillRef>
+          <a:effectRef idx="1">
+            <a:schemeClr val="accent1"/>
+          </a:effectRef>
+          <a:fontRef idx="minor">
+            <a:schemeClr val="dk1"/>
+          </a:fontRef>
+        </p:style>
+        <p:txBody>
+          <a:bodyPr rtlCol="0" anchor="ctr"/>
+          <a:lstStyle/>
+          <a:p>
+            <a:pPr algn="ctr"/>
+            <a:r>
+              <a:rPr lang="en-CA" sz="1200" dirty="0"/>
+              <a:t>…</a:t>
+            </a:r>
           </a:p>
         </p:txBody>
       </p:sp>
       <p:cxnSp>
         <p:nvCxnSpPr>
-          <p:cNvPr id="289" name="Straight Arrow Connector 288">
-            <a:extLst>
-              <a:ext uri="{FF2B5EF4-FFF2-40B4-BE49-F238E27FC236}">
-                <a16:creationId xmlns:a16="http://schemas.microsoft.com/office/drawing/2014/main" id="{884E4F13-F252-A478-74DD-B60AB029F417}"/>
+          <p:cNvPr id="107" name="Connector: Elbow 106">
+            <a:extLst>
+              <a:ext uri="{FF2B5EF4-FFF2-40B4-BE49-F238E27FC236}">
+                <a16:creationId xmlns:a16="http://schemas.microsoft.com/office/drawing/2014/main" id="{7756F972-A40C-03B7-1059-0BC1615F767A}"/>
               </a:ext>
             </a:extLst>
           </p:cNvPr>
           <p:cNvCxnSpPr>
-            <a:stCxn id="286" idx="2"/>
-            <a:endCxn id="74" idx="0"/>
+            <a:stCxn id="140" idx="4"/>
+            <a:endCxn id="240" idx="1"/>
           </p:cNvCxnSpPr>
           <p:nvPr/>
         </p:nvCxnSpPr>
         <p:spPr>
-          <a:xfrm>
-            <a:off x="7833337" y="2567667"/>
-            <a:ext cx="1" cy="640023"/>
-          </a:xfrm>
-          <a:prstGeom prst="straightConnector1">
-            <a:avLst/>
-          </a:prstGeom>
-          <a:ln>
-            <a:tailEnd type="triangle"/>
-          </a:ln>
-        </p:spPr>
-        <p:style>
-          <a:lnRef idx="1">
-            <a:schemeClr val="accent1"/>
-          </a:lnRef>
-          <a:fillRef idx="0">
-            <a:schemeClr val="accent1"/>
-          </a:fillRef>
-          <a:effectRef idx="0">
-            <a:schemeClr val="accent1"/>
-          </a:effectRef>
-          <a:fontRef idx="minor">
-            <a:schemeClr val="tx1"/>
-          </a:fontRef>
-        </p:style>
-      </p:cxnSp>
-      <p:pic>
-        <p:nvPicPr>
-          <p:cNvPr id="293" name="Picture 292" descr="Fuel gauge">
-            <a:extLst>
-              <a:ext uri="{FF2B5EF4-FFF2-40B4-BE49-F238E27FC236}">
-                <a16:creationId xmlns:a16="http://schemas.microsoft.com/office/drawing/2014/main" id="{DE3C188E-6661-BC35-BC06-8A91776ADA99}"/>
-              </a:ext>
-            </a:extLst>
-          </p:cNvPr>
-          <p:cNvPicPr>
-            <a:picLocks noChangeAspect="1"/>
-          </p:cNvPicPr>
-          <p:nvPr/>
-        </p:nvPicPr>
-        <p:blipFill>
-          <a:blip r:embed="rId2">
-            <a:extLst>
-              <a:ext uri="{28A0092B-C50C-407E-A947-70E740481C1C}">
-                <a14:useLocalDpi xmlns:a14="http://schemas.microsoft.com/office/drawing/2010/main" val="0"/>
-              </a:ext>
-            </a:extLst>
-          </a:blip>
-          <a:stretch>
-            <a:fillRect/>
-          </a:stretch>
-        </p:blipFill>
-        <p:spPr>
-          <a:xfrm>
-            <a:off x="10523528" y="2027999"/>
-            <a:ext cx="1584400" cy="1110178"/>
-          </a:xfrm>
-          <a:prstGeom prst="rect">
-            <a:avLst/>
-          </a:prstGeom>
-        </p:spPr>
-      </p:pic>
-      <p:cxnSp>
-        <p:nvCxnSpPr>
-          <p:cNvPr id="295" name="Connector: Elbow 294">
-            <a:extLst>
-              <a:ext uri="{FF2B5EF4-FFF2-40B4-BE49-F238E27FC236}">
-                <a16:creationId xmlns:a16="http://schemas.microsoft.com/office/drawing/2014/main" id="{27FD8666-A28E-16B2-3F03-C7692C6288CA}"/>
-              </a:ext>
-            </a:extLst>
-          </p:cNvPr>
-          <p:cNvCxnSpPr>
-            <a:cxnSpLocks/>
-            <a:stCxn id="240" idx="3"/>
-            <a:endCxn id="293" idx="2"/>
-          </p:cNvCxnSpPr>
-          <p:nvPr/>
-        </p:nvCxnSpPr>
-        <p:spPr>
           <a:xfrm flipV="1">
-            <a:off x="10671522" y="3138177"/>
-            <a:ext cx="644206" cy="761638"/>
-          </a:xfrm>
-          <a:prstGeom prst="bentConnector2">
+            <a:off x="8129329" y="3222209"/>
+            <a:ext cx="1015200" cy="1033520"/>
+          </a:xfrm>
+          <a:prstGeom prst="bentConnector3">
             <a:avLst/>
           </a:prstGeom>
           <a:ln>
@@ -6072,148 +6231,25 @@
       </p:cxnSp>
       <p:cxnSp>
         <p:nvCxnSpPr>
-          <p:cNvPr id="297" name="Connector: Elbow 296">
-            <a:extLst>
-              <a:ext uri="{FF2B5EF4-FFF2-40B4-BE49-F238E27FC236}">
-                <a16:creationId xmlns:a16="http://schemas.microsoft.com/office/drawing/2014/main" id="{D1B2B871-84B3-6D19-9E76-8A25EA194EFE}"/>
+          <p:cNvPr id="110" name="Connector: Elbow 109">
+            <a:extLst>
+              <a:ext uri="{FF2B5EF4-FFF2-40B4-BE49-F238E27FC236}">
+                <a16:creationId xmlns:a16="http://schemas.microsoft.com/office/drawing/2014/main" id="{38344DA9-4142-91C7-1003-382F9C68CDF2}"/>
               </a:ext>
             </a:extLst>
           </p:cNvPr>
           <p:cNvCxnSpPr>
-            <a:cxnSpLocks/>
-            <a:stCxn id="241" idx="3"/>
-            <a:endCxn id="293" idx="2"/>
+            <a:stCxn id="140" idx="4"/>
+            <a:endCxn id="94" idx="1"/>
           </p:cNvCxnSpPr>
           <p:nvPr/>
         </p:nvCxnSpPr>
         <p:spPr>
           <a:xfrm flipV="1">
-            <a:off x="10671522" y="3138177"/>
-            <a:ext cx="644206" cy="1394493"/>
-          </a:xfrm>
-          <a:prstGeom prst="bentConnector2">
-            <a:avLst/>
-          </a:prstGeom>
-          <a:ln>
-            <a:tailEnd type="triangle"/>
-          </a:ln>
-        </p:spPr>
-        <p:style>
-          <a:lnRef idx="1">
-            <a:schemeClr val="accent1"/>
-          </a:lnRef>
-          <a:fillRef idx="0">
-            <a:schemeClr val="accent1"/>
-          </a:fillRef>
-          <a:effectRef idx="0">
-            <a:schemeClr val="accent1"/>
-          </a:effectRef>
-          <a:fontRef idx="minor">
-            <a:schemeClr val="tx1"/>
-          </a:fontRef>
-        </p:style>
-      </p:cxnSp>
-      <p:sp>
-        <p:nvSpPr>
-          <p:cNvPr id="298" name="TextBox 297">
-            <a:extLst>
-              <a:ext uri="{FF2B5EF4-FFF2-40B4-BE49-F238E27FC236}">
-                <a16:creationId xmlns:a16="http://schemas.microsoft.com/office/drawing/2014/main" id="{9BACA8D4-561F-5761-2873-CA5927490398}"/>
-              </a:ext>
-            </a:extLst>
-          </p:cNvPr>
-          <p:cNvSpPr txBox="1"/>
-          <p:nvPr/>
-        </p:nvSpPr>
-        <p:spPr>
-          <a:xfrm>
-            <a:off x="10778600" y="2048952"/>
-            <a:ext cx="1074256" cy="307777"/>
-          </a:xfrm>
-          <a:prstGeom prst="rect">
-            <a:avLst/>
-          </a:prstGeom>
-          <a:noFill/>
-        </p:spPr>
-        <p:txBody>
-          <a:bodyPr wrap="square" rtlCol="0">
-            <a:spAutoFit/>
-          </a:bodyPr>
-          <a:lstStyle/>
-          <a:p>
-            <a:r>
-              <a:rPr lang="en-US" sz="1400" dirty="0">
-                <a:solidFill>
-                  <a:schemeClr val="bg1"/>
-                </a:solidFill>
-              </a:rPr>
-              <a:t>Dashboards</a:t>
-            </a:r>
-            <a:endParaRPr lang="en-CA" sz="1400" dirty="0">
-              <a:solidFill>
-                <a:schemeClr val="bg1"/>
-              </a:solidFill>
-            </a:endParaRPr>
-          </a:p>
-        </p:txBody>
-      </p:sp>
-      <p:pic>
-        <p:nvPicPr>
-          <p:cNvPr id="302" name="Picture 301" descr="Magnifying glass showing decling performance">
-            <a:extLst>
-              <a:ext uri="{FF2B5EF4-FFF2-40B4-BE49-F238E27FC236}">
-                <a16:creationId xmlns:a16="http://schemas.microsoft.com/office/drawing/2014/main" id="{AECCE46A-B5F8-0A79-3530-AF82D798BA9D}"/>
-              </a:ext>
-            </a:extLst>
-          </p:cNvPr>
-          <p:cNvPicPr>
-            <a:picLocks noChangeAspect="1"/>
-          </p:cNvPicPr>
-          <p:nvPr/>
-        </p:nvPicPr>
-        <p:blipFill>
-          <a:blip r:embed="rId3">
-            <a:extLst>
-              <a:ext uri="{28A0092B-C50C-407E-A947-70E740481C1C}">
-                <a14:useLocalDpi xmlns:a14="http://schemas.microsoft.com/office/drawing/2010/main" val="0"/>
-              </a:ext>
-            </a:extLst>
-          </a:blip>
-          <a:stretch>
-            <a:fillRect/>
-          </a:stretch>
-        </p:blipFill>
-        <p:spPr>
-          <a:xfrm>
-            <a:off x="10523528" y="5192504"/>
-            <a:ext cx="1584400" cy="1110178"/>
-          </a:xfrm>
-          <a:prstGeom prst="rect">
-            <a:avLst/>
-          </a:prstGeom>
-        </p:spPr>
-      </p:pic>
-      <p:cxnSp>
-        <p:nvCxnSpPr>
-          <p:cNvPr id="304" name="Connector: Elbow 303">
-            <a:extLst>
-              <a:ext uri="{FF2B5EF4-FFF2-40B4-BE49-F238E27FC236}">
-                <a16:creationId xmlns:a16="http://schemas.microsoft.com/office/drawing/2014/main" id="{F4921ED0-AA8B-B723-F884-F4469184C57C}"/>
-              </a:ext>
-            </a:extLst>
-          </p:cNvPr>
-          <p:cNvCxnSpPr>
-            <a:stCxn id="241" idx="3"/>
-            <a:endCxn id="302" idx="0"/>
-          </p:cNvCxnSpPr>
-          <p:nvPr/>
-        </p:nvCxnSpPr>
-        <p:spPr>
-          <a:xfrm>
-            <a:off x="10671522" y="4532670"/>
-            <a:ext cx="644206" cy="659834"/>
-          </a:xfrm>
-          <a:prstGeom prst="bentConnector2">
+            <a:off x="8129329" y="4097494"/>
+            <a:ext cx="1015200" cy="158235"/>
+          </a:xfrm>
+          <a:prstGeom prst="bentConnector3">
             <a:avLst/>
           </a:prstGeom>
           <a:ln>
@@ -6237,25 +6273,25 @@
       </p:cxnSp>
       <p:cxnSp>
         <p:nvCxnSpPr>
-          <p:cNvPr id="306" name="Connector: Elbow 305">
-            <a:extLst>
-              <a:ext uri="{FF2B5EF4-FFF2-40B4-BE49-F238E27FC236}">
-                <a16:creationId xmlns:a16="http://schemas.microsoft.com/office/drawing/2014/main" id="{23BB8377-3FBD-D540-1F8B-CD1C6F2472C2}"/>
+          <p:cNvPr id="112" name="Connector: Elbow 111">
+            <a:extLst>
+              <a:ext uri="{FF2B5EF4-FFF2-40B4-BE49-F238E27FC236}">
+                <a16:creationId xmlns:a16="http://schemas.microsoft.com/office/drawing/2014/main" id="{05E035BB-C905-17A7-3E98-8445E3F4DC75}"/>
               </a:ext>
             </a:extLst>
           </p:cNvPr>
           <p:cNvCxnSpPr>
-            <a:stCxn id="240" idx="3"/>
-            <a:endCxn id="302" idx="0"/>
+            <a:stCxn id="140" idx="4"/>
+            <a:endCxn id="95" idx="1"/>
           </p:cNvCxnSpPr>
           <p:nvPr/>
         </p:nvCxnSpPr>
         <p:spPr>
           <a:xfrm>
-            <a:off x="10671522" y="3899815"/>
-            <a:ext cx="644206" cy="1292689"/>
-          </a:xfrm>
-          <a:prstGeom prst="bentConnector2">
+            <a:off x="8129329" y="4255729"/>
+            <a:ext cx="1015200" cy="151342"/>
+          </a:xfrm>
+          <a:prstGeom prst="bentConnector3">
             <a:avLst/>
           </a:prstGeom>
           <a:ln>
@@ -6277,50 +6313,948 @@
           </a:fontRef>
         </p:style>
       </p:cxnSp>
-      <p:sp>
-        <p:nvSpPr>
-          <p:cNvPr id="307" name="TextBox 306">
-            <a:extLst>
-              <a:ext uri="{FF2B5EF4-FFF2-40B4-BE49-F238E27FC236}">
-                <a16:creationId xmlns:a16="http://schemas.microsoft.com/office/drawing/2014/main" id="{EFC59380-0C41-A067-018B-37D86DCEA9A8}"/>
-              </a:ext>
-            </a:extLst>
-          </p:cNvPr>
-          <p:cNvSpPr txBox="1"/>
+      <p:cxnSp>
+        <p:nvCxnSpPr>
+          <p:cNvPr id="114" name="Connector: Elbow 113">
+            <a:extLst>
+              <a:ext uri="{FF2B5EF4-FFF2-40B4-BE49-F238E27FC236}">
+                <a16:creationId xmlns:a16="http://schemas.microsoft.com/office/drawing/2014/main" id="{CBFAC34D-3E83-5126-B421-AF2337EF9733}"/>
+              </a:ext>
+            </a:extLst>
+          </p:cNvPr>
+          <p:cNvCxnSpPr>
+            <a:stCxn id="140" idx="4"/>
+            <a:endCxn id="104" idx="1"/>
+          </p:cNvCxnSpPr>
           <p:nvPr/>
-        </p:nvSpPr>
-        <p:spPr>
-          <a:xfrm>
-            <a:off x="10456497" y="6026826"/>
-            <a:ext cx="1074256" cy="307777"/>
+        </p:nvCxnSpPr>
+        <p:spPr>
+          <a:xfrm>
+            <a:off x="8129329" y="4255729"/>
+            <a:ext cx="1011867" cy="489133"/>
+          </a:xfrm>
+          <a:prstGeom prst="bentConnector3">
+            <a:avLst/>
+          </a:prstGeom>
+          <a:ln>
+            <a:tailEnd type="triangle"/>
+          </a:ln>
+        </p:spPr>
+        <p:style>
+          <a:lnRef idx="1">
+            <a:schemeClr val="accent1"/>
+          </a:lnRef>
+          <a:fillRef idx="0">
+            <a:schemeClr val="accent1"/>
+          </a:fillRef>
+          <a:effectRef idx="0">
+            <a:schemeClr val="accent1"/>
+          </a:effectRef>
+          <a:fontRef idx="minor">
+            <a:schemeClr val="tx1"/>
+          </a:fontRef>
+        </p:style>
+      </p:cxnSp>
+      <p:sp>
+        <p:nvSpPr>
+          <p:cNvPr id="131" name="Title 1">
+            <a:extLst>
+              <a:ext uri="{FF2B5EF4-FFF2-40B4-BE49-F238E27FC236}">
+                <a16:creationId xmlns:a16="http://schemas.microsoft.com/office/drawing/2014/main" id="{705139D5-EF1D-8EC3-8000-F88D0D5B82A4}"/>
+              </a:ext>
+            </a:extLst>
+          </p:cNvPr>
+          <p:cNvSpPr txBox="1">
+            <a:spLocks/>
+          </p:cNvSpPr>
+          <p:nvPr/>
+        </p:nvSpPr>
+        <p:spPr>
+          <a:xfrm>
+            <a:off x="339482" y="6203890"/>
+            <a:ext cx="3382751" cy="625580"/>
           </a:xfrm>
           <a:prstGeom prst="rect">
             <a:avLst/>
           </a:prstGeom>
-          <a:noFill/>
-        </p:spPr>
-        <p:txBody>
-          <a:bodyPr wrap="square" rtlCol="0">
-            <a:spAutoFit/>
-          </a:bodyPr>
-          <a:lstStyle/>
-          <a:p>
-            <a:r>
-              <a:rPr lang="en-US" sz="1400" dirty="0">
+        </p:spPr>
+        <p:txBody>
+          <a:bodyPr/>
+          <a:lstStyle>
+            <a:lvl1pPr algn="l" defTabSz="914400" rtl="0" eaLnBrk="1" latinLnBrk="0" hangingPunct="1">
+              <a:lnSpc>
+                <a:spcPct val="90000"/>
+              </a:lnSpc>
+              <a:spcBef>
+                <a:spcPct val="0"/>
+              </a:spcBef>
+              <a:buNone/>
+              <a:defRPr sz="4400" kern="1200">
                 <a:solidFill>
-                  <a:schemeClr val="bg1"/>
+                  <a:schemeClr val="tx1"/>
                 </a:solidFill>
-              </a:rPr>
-              <a:t>Reports</a:t>
-            </a:r>
-            <a:endParaRPr lang="en-CA" sz="1400" dirty="0">
-              <a:solidFill>
-                <a:schemeClr val="bg1"/>
-              </a:solidFill>
-            </a:endParaRPr>
-          </a:p>
-        </p:txBody>
-      </p:sp>
+                <a:latin typeface="+mj-lt"/>
+                <a:ea typeface="+mj-ea"/>
+                <a:cs typeface="+mj-cs"/>
+              </a:defRPr>
+            </a:lvl1pPr>
+          </a:lstStyle>
+          <a:p>
+            <a:r>
+              <a:rPr lang="en-US" dirty="0" err="1"/>
+              <a:t>Shotgrid</a:t>
+            </a:r>
+            <a:r>
+              <a:rPr lang="en-US" dirty="0"/>
+              <a:t> ORM</a:t>
+            </a:r>
+            <a:endParaRPr lang="en-CA" dirty="0"/>
+          </a:p>
+        </p:txBody>
+      </p:sp>
+      <p:sp>
+        <p:nvSpPr>
+          <p:cNvPr id="132" name="Subtitle 2">
+            <a:extLst>
+              <a:ext uri="{FF2B5EF4-FFF2-40B4-BE49-F238E27FC236}">
+                <a16:creationId xmlns:a16="http://schemas.microsoft.com/office/drawing/2014/main" id="{409FE37E-E992-5AFF-A36B-16B23931F55E}"/>
+              </a:ext>
+            </a:extLst>
+          </p:cNvPr>
+          <p:cNvSpPr txBox="1">
+            <a:spLocks/>
+          </p:cNvSpPr>
+          <p:nvPr/>
+        </p:nvSpPr>
+        <p:spPr>
+          <a:xfrm>
+            <a:off x="3839170" y="6238738"/>
+            <a:ext cx="4620474" cy="317500"/>
+          </a:xfrm>
+          <a:prstGeom prst="rect">
+            <a:avLst/>
+          </a:prstGeom>
+        </p:spPr>
+        <p:txBody>
+          <a:bodyPr/>
+          <a:lstStyle>
+            <a:lvl1pPr marL="228600" indent="-228600" algn="l" defTabSz="914400" rtl="0" eaLnBrk="1" latinLnBrk="0" hangingPunct="1">
+              <a:lnSpc>
+                <a:spcPct val="90000"/>
+              </a:lnSpc>
+              <a:spcBef>
+                <a:spcPts val="1000"/>
+              </a:spcBef>
+              <a:buFont typeface="Arial" panose="020B0604020202020204" pitchFamily="34" charset="0"/>
+              <a:buChar char="•"/>
+              <a:defRPr sz="2800" kern="1200">
+                <a:solidFill>
+                  <a:schemeClr val="tx1"/>
+                </a:solidFill>
+                <a:latin typeface="+mn-lt"/>
+                <a:ea typeface="+mn-ea"/>
+                <a:cs typeface="+mn-cs"/>
+              </a:defRPr>
+            </a:lvl1pPr>
+            <a:lvl2pPr marL="685800" indent="-228600" algn="l" defTabSz="914400" rtl="0" eaLnBrk="1" latinLnBrk="0" hangingPunct="1">
+              <a:lnSpc>
+                <a:spcPct val="90000"/>
+              </a:lnSpc>
+              <a:spcBef>
+                <a:spcPts val="500"/>
+              </a:spcBef>
+              <a:buFont typeface="Arial" panose="020B0604020202020204" pitchFamily="34" charset="0"/>
+              <a:buChar char="•"/>
+              <a:defRPr sz="2400" kern="1200">
+                <a:solidFill>
+                  <a:schemeClr val="tx1"/>
+                </a:solidFill>
+                <a:latin typeface="+mn-lt"/>
+                <a:ea typeface="+mn-ea"/>
+                <a:cs typeface="+mn-cs"/>
+              </a:defRPr>
+            </a:lvl2pPr>
+            <a:lvl3pPr marL="1143000" indent="-228600" algn="l" defTabSz="914400" rtl="0" eaLnBrk="1" latinLnBrk="0" hangingPunct="1">
+              <a:lnSpc>
+                <a:spcPct val="90000"/>
+              </a:lnSpc>
+              <a:spcBef>
+                <a:spcPts val="500"/>
+              </a:spcBef>
+              <a:buFont typeface="Arial" panose="020B0604020202020204" pitchFamily="34" charset="0"/>
+              <a:buChar char="•"/>
+              <a:defRPr sz="2000" kern="1200">
+                <a:solidFill>
+                  <a:schemeClr val="tx1"/>
+                </a:solidFill>
+                <a:latin typeface="+mn-lt"/>
+                <a:ea typeface="+mn-ea"/>
+                <a:cs typeface="+mn-cs"/>
+              </a:defRPr>
+            </a:lvl3pPr>
+            <a:lvl4pPr marL="1600200" indent="-228600" algn="l" defTabSz="914400" rtl="0" eaLnBrk="1" latinLnBrk="0" hangingPunct="1">
+              <a:lnSpc>
+                <a:spcPct val="90000"/>
+              </a:lnSpc>
+              <a:spcBef>
+                <a:spcPts val="500"/>
+              </a:spcBef>
+              <a:buFont typeface="Arial" panose="020B0604020202020204" pitchFamily="34" charset="0"/>
+              <a:buChar char="•"/>
+              <a:defRPr sz="1800" kern="1200">
+                <a:solidFill>
+                  <a:schemeClr val="tx1"/>
+                </a:solidFill>
+                <a:latin typeface="+mn-lt"/>
+                <a:ea typeface="+mn-ea"/>
+                <a:cs typeface="+mn-cs"/>
+              </a:defRPr>
+            </a:lvl4pPr>
+            <a:lvl5pPr marL="2057400" indent="-228600" algn="l" defTabSz="914400" rtl="0" eaLnBrk="1" latinLnBrk="0" hangingPunct="1">
+              <a:lnSpc>
+                <a:spcPct val="90000"/>
+              </a:lnSpc>
+              <a:spcBef>
+                <a:spcPts val="500"/>
+              </a:spcBef>
+              <a:buFont typeface="Arial" panose="020B0604020202020204" pitchFamily="34" charset="0"/>
+              <a:buChar char="•"/>
+              <a:defRPr sz="1800" kern="1200">
+                <a:solidFill>
+                  <a:schemeClr val="tx1"/>
+                </a:solidFill>
+                <a:latin typeface="+mn-lt"/>
+                <a:ea typeface="+mn-ea"/>
+                <a:cs typeface="+mn-cs"/>
+              </a:defRPr>
+            </a:lvl5pPr>
+            <a:lvl6pPr marL="2514600" indent="-228600" algn="l" defTabSz="914400" rtl="0" eaLnBrk="1" latinLnBrk="0" hangingPunct="1">
+              <a:lnSpc>
+                <a:spcPct val="90000"/>
+              </a:lnSpc>
+              <a:spcBef>
+                <a:spcPts val="500"/>
+              </a:spcBef>
+              <a:buFont typeface="Arial" panose="020B0604020202020204" pitchFamily="34" charset="0"/>
+              <a:buChar char="•"/>
+              <a:defRPr sz="1800" kern="1200">
+                <a:solidFill>
+                  <a:schemeClr val="tx1"/>
+                </a:solidFill>
+                <a:latin typeface="+mn-lt"/>
+                <a:ea typeface="+mn-ea"/>
+                <a:cs typeface="+mn-cs"/>
+              </a:defRPr>
+            </a:lvl6pPr>
+            <a:lvl7pPr marL="2971800" indent="-228600" algn="l" defTabSz="914400" rtl="0" eaLnBrk="1" latinLnBrk="0" hangingPunct="1">
+              <a:lnSpc>
+                <a:spcPct val="90000"/>
+              </a:lnSpc>
+              <a:spcBef>
+                <a:spcPts val="500"/>
+              </a:spcBef>
+              <a:buFont typeface="Arial" panose="020B0604020202020204" pitchFamily="34" charset="0"/>
+              <a:buChar char="•"/>
+              <a:defRPr sz="1800" kern="1200">
+                <a:solidFill>
+                  <a:schemeClr val="tx1"/>
+                </a:solidFill>
+                <a:latin typeface="+mn-lt"/>
+                <a:ea typeface="+mn-ea"/>
+                <a:cs typeface="+mn-cs"/>
+              </a:defRPr>
+            </a:lvl7pPr>
+            <a:lvl8pPr marL="3429000" indent="-228600" algn="l" defTabSz="914400" rtl="0" eaLnBrk="1" latinLnBrk="0" hangingPunct="1">
+              <a:lnSpc>
+                <a:spcPct val="90000"/>
+              </a:lnSpc>
+              <a:spcBef>
+                <a:spcPts val="500"/>
+              </a:spcBef>
+              <a:buFont typeface="Arial" panose="020B0604020202020204" pitchFamily="34" charset="0"/>
+              <a:buChar char="•"/>
+              <a:defRPr sz="1800" kern="1200">
+                <a:solidFill>
+                  <a:schemeClr val="tx1"/>
+                </a:solidFill>
+                <a:latin typeface="+mn-lt"/>
+                <a:ea typeface="+mn-ea"/>
+                <a:cs typeface="+mn-cs"/>
+              </a:defRPr>
+            </a:lvl8pPr>
+            <a:lvl9pPr marL="3886200" indent="-228600" algn="l" defTabSz="914400" rtl="0" eaLnBrk="1" latinLnBrk="0" hangingPunct="1">
+              <a:lnSpc>
+                <a:spcPct val="90000"/>
+              </a:lnSpc>
+              <a:spcBef>
+                <a:spcPts val="500"/>
+              </a:spcBef>
+              <a:buFont typeface="Arial" panose="020B0604020202020204" pitchFamily="34" charset="0"/>
+              <a:buChar char="•"/>
+              <a:defRPr sz="1800" kern="1200">
+                <a:solidFill>
+                  <a:schemeClr val="tx1"/>
+                </a:solidFill>
+                <a:latin typeface="+mn-lt"/>
+                <a:ea typeface="+mn-ea"/>
+                <a:cs typeface="+mn-cs"/>
+              </a:defRPr>
+            </a:lvl9pPr>
+          </a:lstStyle>
+          <a:p>
+            <a:pPr marL="0" indent="0">
+              <a:lnSpc>
+                <a:spcPct val="100000"/>
+              </a:lnSpc>
+              <a:buNone/>
+            </a:pPr>
+            <a:r>
+              <a:rPr lang="en-US" sz="1800" dirty="0" err="1"/>
+              <a:t>Shotgrid</a:t>
+            </a:r>
+            <a:r>
+              <a:rPr lang="en-US" sz="1800" dirty="0"/>
+              <a:t> Object Relational Model Management </a:t>
+            </a:r>
+          </a:p>
+        </p:txBody>
+      </p:sp>
+      <p:sp>
+        <p:nvSpPr>
+          <p:cNvPr id="133" name="Subtitle 2">
+            <a:extLst>
+              <a:ext uri="{FF2B5EF4-FFF2-40B4-BE49-F238E27FC236}">
+                <a16:creationId xmlns:a16="http://schemas.microsoft.com/office/drawing/2014/main" id="{73E8A132-95F9-17DE-F591-914A39B0A1B1}"/>
+              </a:ext>
+            </a:extLst>
+          </p:cNvPr>
+          <p:cNvSpPr txBox="1">
+            <a:spLocks/>
+          </p:cNvSpPr>
+          <p:nvPr/>
+        </p:nvSpPr>
+        <p:spPr>
+          <a:xfrm>
+            <a:off x="3839170" y="6467553"/>
+            <a:ext cx="2340618" cy="317500"/>
+          </a:xfrm>
+          <a:prstGeom prst="rect">
+            <a:avLst/>
+          </a:prstGeom>
+        </p:spPr>
+        <p:txBody>
+          <a:bodyPr/>
+          <a:lstStyle>
+            <a:lvl1pPr marL="228600" indent="-228600" algn="l" defTabSz="914400" rtl="0" eaLnBrk="1" latinLnBrk="0" hangingPunct="1">
+              <a:lnSpc>
+                <a:spcPct val="90000"/>
+              </a:lnSpc>
+              <a:spcBef>
+                <a:spcPts val="1000"/>
+              </a:spcBef>
+              <a:buFont typeface="Arial" panose="020B0604020202020204" pitchFamily="34" charset="0"/>
+              <a:buChar char="•"/>
+              <a:defRPr sz="2800" kern="1200">
+                <a:solidFill>
+                  <a:schemeClr val="tx1"/>
+                </a:solidFill>
+                <a:latin typeface="+mn-lt"/>
+                <a:ea typeface="+mn-ea"/>
+                <a:cs typeface="+mn-cs"/>
+              </a:defRPr>
+            </a:lvl1pPr>
+            <a:lvl2pPr marL="685800" indent="-228600" algn="l" defTabSz="914400" rtl="0" eaLnBrk="1" latinLnBrk="0" hangingPunct="1">
+              <a:lnSpc>
+                <a:spcPct val="90000"/>
+              </a:lnSpc>
+              <a:spcBef>
+                <a:spcPts val="500"/>
+              </a:spcBef>
+              <a:buFont typeface="Arial" panose="020B0604020202020204" pitchFamily="34" charset="0"/>
+              <a:buChar char="•"/>
+              <a:defRPr sz="2400" kern="1200">
+                <a:solidFill>
+                  <a:schemeClr val="tx1"/>
+                </a:solidFill>
+                <a:latin typeface="+mn-lt"/>
+                <a:ea typeface="+mn-ea"/>
+                <a:cs typeface="+mn-cs"/>
+              </a:defRPr>
+            </a:lvl2pPr>
+            <a:lvl3pPr marL="1143000" indent="-228600" algn="l" defTabSz="914400" rtl="0" eaLnBrk="1" latinLnBrk="0" hangingPunct="1">
+              <a:lnSpc>
+                <a:spcPct val="90000"/>
+              </a:lnSpc>
+              <a:spcBef>
+                <a:spcPts val="500"/>
+              </a:spcBef>
+              <a:buFont typeface="Arial" panose="020B0604020202020204" pitchFamily="34" charset="0"/>
+              <a:buChar char="•"/>
+              <a:defRPr sz="2000" kern="1200">
+                <a:solidFill>
+                  <a:schemeClr val="tx1"/>
+                </a:solidFill>
+                <a:latin typeface="+mn-lt"/>
+                <a:ea typeface="+mn-ea"/>
+                <a:cs typeface="+mn-cs"/>
+              </a:defRPr>
+            </a:lvl3pPr>
+            <a:lvl4pPr marL="1600200" indent="-228600" algn="l" defTabSz="914400" rtl="0" eaLnBrk="1" latinLnBrk="0" hangingPunct="1">
+              <a:lnSpc>
+                <a:spcPct val="90000"/>
+              </a:lnSpc>
+              <a:spcBef>
+                <a:spcPts val="500"/>
+              </a:spcBef>
+              <a:buFont typeface="Arial" panose="020B0604020202020204" pitchFamily="34" charset="0"/>
+              <a:buChar char="•"/>
+              <a:defRPr sz="1800" kern="1200">
+                <a:solidFill>
+                  <a:schemeClr val="tx1"/>
+                </a:solidFill>
+                <a:latin typeface="+mn-lt"/>
+                <a:ea typeface="+mn-ea"/>
+                <a:cs typeface="+mn-cs"/>
+              </a:defRPr>
+            </a:lvl4pPr>
+            <a:lvl5pPr marL="2057400" indent="-228600" algn="l" defTabSz="914400" rtl="0" eaLnBrk="1" latinLnBrk="0" hangingPunct="1">
+              <a:lnSpc>
+                <a:spcPct val="90000"/>
+              </a:lnSpc>
+              <a:spcBef>
+                <a:spcPts val="500"/>
+              </a:spcBef>
+              <a:buFont typeface="Arial" panose="020B0604020202020204" pitchFamily="34" charset="0"/>
+              <a:buChar char="•"/>
+              <a:defRPr sz="1800" kern="1200">
+                <a:solidFill>
+                  <a:schemeClr val="tx1"/>
+                </a:solidFill>
+                <a:latin typeface="+mn-lt"/>
+                <a:ea typeface="+mn-ea"/>
+                <a:cs typeface="+mn-cs"/>
+              </a:defRPr>
+            </a:lvl5pPr>
+            <a:lvl6pPr marL="2514600" indent="-228600" algn="l" defTabSz="914400" rtl="0" eaLnBrk="1" latinLnBrk="0" hangingPunct="1">
+              <a:lnSpc>
+                <a:spcPct val="90000"/>
+              </a:lnSpc>
+              <a:spcBef>
+                <a:spcPts val="500"/>
+              </a:spcBef>
+              <a:buFont typeface="Arial" panose="020B0604020202020204" pitchFamily="34" charset="0"/>
+              <a:buChar char="•"/>
+              <a:defRPr sz="1800" kern="1200">
+                <a:solidFill>
+                  <a:schemeClr val="tx1"/>
+                </a:solidFill>
+                <a:latin typeface="+mn-lt"/>
+                <a:ea typeface="+mn-ea"/>
+                <a:cs typeface="+mn-cs"/>
+              </a:defRPr>
+            </a:lvl6pPr>
+            <a:lvl7pPr marL="2971800" indent="-228600" algn="l" defTabSz="914400" rtl="0" eaLnBrk="1" latinLnBrk="0" hangingPunct="1">
+              <a:lnSpc>
+                <a:spcPct val="90000"/>
+              </a:lnSpc>
+              <a:spcBef>
+                <a:spcPts val="500"/>
+              </a:spcBef>
+              <a:buFont typeface="Arial" panose="020B0604020202020204" pitchFamily="34" charset="0"/>
+              <a:buChar char="•"/>
+              <a:defRPr sz="1800" kern="1200">
+                <a:solidFill>
+                  <a:schemeClr val="tx1"/>
+                </a:solidFill>
+                <a:latin typeface="+mn-lt"/>
+                <a:ea typeface="+mn-ea"/>
+                <a:cs typeface="+mn-cs"/>
+              </a:defRPr>
+            </a:lvl7pPr>
+            <a:lvl8pPr marL="3429000" indent="-228600" algn="l" defTabSz="914400" rtl="0" eaLnBrk="1" latinLnBrk="0" hangingPunct="1">
+              <a:lnSpc>
+                <a:spcPct val="90000"/>
+              </a:lnSpc>
+              <a:spcBef>
+                <a:spcPts val="500"/>
+              </a:spcBef>
+              <a:buFont typeface="Arial" panose="020B0604020202020204" pitchFamily="34" charset="0"/>
+              <a:buChar char="•"/>
+              <a:defRPr sz="1800" kern="1200">
+                <a:solidFill>
+                  <a:schemeClr val="tx1"/>
+                </a:solidFill>
+                <a:latin typeface="+mn-lt"/>
+                <a:ea typeface="+mn-ea"/>
+                <a:cs typeface="+mn-cs"/>
+              </a:defRPr>
+            </a:lvl8pPr>
+            <a:lvl9pPr marL="3886200" indent="-228600" algn="l" defTabSz="914400" rtl="0" eaLnBrk="1" latinLnBrk="0" hangingPunct="1">
+              <a:lnSpc>
+                <a:spcPct val="90000"/>
+              </a:lnSpc>
+              <a:spcBef>
+                <a:spcPts val="500"/>
+              </a:spcBef>
+              <a:buFont typeface="Arial" panose="020B0604020202020204" pitchFamily="34" charset="0"/>
+              <a:buChar char="•"/>
+              <a:defRPr sz="1800" kern="1200">
+                <a:solidFill>
+                  <a:schemeClr val="tx1"/>
+                </a:solidFill>
+                <a:latin typeface="+mn-lt"/>
+                <a:ea typeface="+mn-ea"/>
+                <a:cs typeface="+mn-cs"/>
+              </a:defRPr>
+            </a:lvl9pPr>
+          </a:lstStyle>
+          <a:p>
+            <a:pPr marL="0" indent="0">
+              <a:lnSpc>
+                <a:spcPct val="100000"/>
+              </a:lnSpc>
+              <a:buNone/>
+            </a:pPr>
+            <a:r>
+              <a:rPr lang="en-US" sz="1800" dirty="0"/>
+              <a:t>John E. Tran, 2024</a:t>
+            </a:r>
+            <a:endParaRPr lang="en-CA" sz="1800" dirty="0"/>
+          </a:p>
+        </p:txBody>
+      </p:sp>
+      <p:sp>
+        <p:nvSpPr>
+          <p:cNvPr id="134" name="Flowchart: Predefined Process 133">
+            <a:extLst>
+              <a:ext uri="{FF2B5EF4-FFF2-40B4-BE49-F238E27FC236}">
+                <a16:creationId xmlns:a16="http://schemas.microsoft.com/office/drawing/2014/main" id="{7BD53A21-CAAF-4CFC-12E6-85C1B72467F0}"/>
+              </a:ext>
+            </a:extLst>
+          </p:cNvPr>
+          <p:cNvSpPr/>
+          <p:nvPr/>
+        </p:nvSpPr>
+        <p:spPr>
+          <a:xfrm>
+            <a:off x="9144529" y="5280255"/>
+            <a:ext cx="1350078" cy="381930"/>
+          </a:xfrm>
+          <a:prstGeom prst="flowChartPredefinedProcess">
+            <a:avLst/>
+          </a:prstGeom>
+        </p:spPr>
+        <p:style>
+          <a:lnRef idx="0">
+            <a:schemeClr val="accent5"/>
+          </a:lnRef>
+          <a:fillRef idx="3">
+            <a:schemeClr val="accent5"/>
+          </a:fillRef>
+          <a:effectRef idx="3">
+            <a:schemeClr val="accent5"/>
+          </a:effectRef>
+          <a:fontRef idx="minor">
+            <a:schemeClr val="lt1"/>
+          </a:fontRef>
+        </p:style>
+        <p:txBody>
+          <a:bodyPr rtlCol="0" anchor="ctr"/>
+          <a:lstStyle/>
+          <a:p>
+            <a:pPr algn="ctr"/>
+            <a:r>
+              <a:rPr lang="en-US" sz="1200" dirty="0"/>
+              <a:t>Business Systems</a:t>
+            </a:r>
+            <a:endParaRPr lang="en-CA" sz="1200" dirty="0"/>
+          </a:p>
+        </p:txBody>
+      </p:sp>
+      <p:cxnSp>
+        <p:nvCxnSpPr>
+          <p:cNvPr id="176" name="Connector: Elbow 175">
+            <a:extLst>
+              <a:ext uri="{FF2B5EF4-FFF2-40B4-BE49-F238E27FC236}">
+                <a16:creationId xmlns:a16="http://schemas.microsoft.com/office/drawing/2014/main" id="{E8F2328D-B838-9FEA-042B-7ABFC5F0118A}"/>
+              </a:ext>
+            </a:extLst>
+          </p:cNvPr>
+          <p:cNvCxnSpPr>
+            <a:stCxn id="240" idx="3"/>
+            <a:endCxn id="293" idx="1"/>
+          </p:cNvCxnSpPr>
+          <p:nvPr/>
+        </p:nvCxnSpPr>
+        <p:spPr>
+          <a:xfrm>
+            <a:off x="10494607" y="3222209"/>
+            <a:ext cx="236873" cy="144859"/>
+          </a:xfrm>
+          <a:prstGeom prst="bentConnector3">
+            <a:avLst/>
+          </a:prstGeom>
+          <a:ln>
+            <a:tailEnd type="triangle"/>
+          </a:ln>
+        </p:spPr>
+        <p:style>
+          <a:lnRef idx="1">
+            <a:schemeClr val="accent1"/>
+          </a:lnRef>
+          <a:fillRef idx="0">
+            <a:schemeClr val="accent1"/>
+          </a:fillRef>
+          <a:effectRef idx="0">
+            <a:schemeClr val="accent1"/>
+          </a:effectRef>
+          <a:fontRef idx="minor">
+            <a:schemeClr val="tx1"/>
+          </a:fontRef>
+        </p:style>
+      </p:cxnSp>
+      <p:cxnSp>
+        <p:nvCxnSpPr>
+          <p:cNvPr id="179" name="Connector: Elbow 178">
+            <a:extLst>
+              <a:ext uri="{FF2B5EF4-FFF2-40B4-BE49-F238E27FC236}">
+                <a16:creationId xmlns:a16="http://schemas.microsoft.com/office/drawing/2014/main" id="{271917DD-B497-123A-9100-A7363ECE9CF2}"/>
+              </a:ext>
+            </a:extLst>
+          </p:cNvPr>
+          <p:cNvCxnSpPr>
+            <a:stCxn id="241" idx="3"/>
+            <a:endCxn id="293" idx="1"/>
+          </p:cNvCxnSpPr>
+          <p:nvPr/>
+        </p:nvCxnSpPr>
+        <p:spPr>
+          <a:xfrm flipV="1">
+            <a:off x="10494607" y="3367068"/>
+            <a:ext cx="236873" cy="339559"/>
+          </a:xfrm>
+          <a:prstGeom prst="bentConnector3">
+            <a:avLst/>
+          </a:prstGeom>
+          <a:ln>
+            <a:tailEnd type="triangle"/>
+          </a:ln>
+        </p:spPr>
+        <p:style>
+          <a:lnRef idx="1">
+            <a:schemeClr val="accent1"/>
+          </a:lnRef>
+          <a:fillRef idx="0">
+            <a:schemeClr val="accent1"/>
+          </a:fillRef>
+          <a:effectRef idx="0">
+            <a:schemeClr val="accent1"/>
+          </a:effectRef>
+          <a:fontRef idx="minor">
+            <a:schemeClr val="tx1"/>
+          </a:fontRef>
+        </p:style>
+      </p:cxnSp>
+      <p:cxnSp>
+        <p:nvCxnSpPr>
+          <p:cNvPr id="195" name="Connector: Elbow 194">
+            <a:extLst>
+              <a:ext uri="{FF2B5EF4-FFF2-40B4-BE49-F238E27FC236}">
+                <a16:creationId xmlns:a16="http://schemas.microsoft.com/office/drawing/2014/main" id="{62E0B37A-DFFA-A799-4143-EA05AE371423}"/>
+              </a:ext>
+            </a:extLst>
+          </p:cNvPr>
+          <p:cNvCxnSpPr>
+            <a:stCxn id="94" idx="3"/>
+            <a:endCxn id="293" idx="1"/>
+          </p:cNvCxnSpPr>
+          <p:nvPr/>
+        </p:nvCxnSpPr>
+        <p:spPr>
+          <a:xfrm flipV="1">
+            <a:off x="10494607" y="3367068"/>
+            <a:ext cx="236873" cy="730426"/>
+          </a:xfrm>
+          <a:prstGeom prst="bentConnector3">
+            <a:avLst/>
+          </a:prstGeom>
+          <a:ln>
+            <a:tailEnd type="triangle"/>
+          </a:ln>
+        </p:spPr>
+        <p:style>
+          <a:lnRef idx="1">
+            <a:schemeClr val="accent1"/>
+          </a:lnRef>
+          <a:fillRef idx="0">
+            <a:schemeClr val="accent1"/>
+          </a:fillRef>
+          <a:effectRef idx="0">
+            <a:schemeClr val="accent1"/>
+          </a:effectRef>
+          <a:fontRef idx="minor">
+            <a:schemeClr val="tx1"/>
+          </a:fontRef>
+        </p:style>
+      </p:cxnSp>
+      <p:sp>
+        <p:nvSpPr>
+          <p:cNvPr id="199" name="Flowchart: Predefined Process 198">
+            <a:extLst>
+              <a:ext uri="{FF2B5EF4-FFF2-40B4-BE49-F238E27FC236}">
+                <a16:creationId xmlns:a16="http://schemas.microsoft.com/office/drawing/2014/main" id="{6EC47786-A193-DA42-0A19-B9B3B4484365}"/>
+              </a:ext>
+            </a:extLst>
+          </p:cNvPr>
+          <p:cNvSpPr/>
+          <p:nvPr/>
+        </p:nvSpPr>
+        <p:spPr>
+          <a:xfrm>
+            <a:off x="9144529" y="5796877"/>
+            <a:ext cx="1350078" cy="381930"/>
+          </a:xfrm>
+          <a:prstGeom prst="flowChartPredefinedProcess">
+            <a:avLst/>
+          </a:prstGeom>
+        </p:spPr>
+        <p:style>
+          <a:lnRef idx="0">
+            <a:schemeClr val="accent5"/>
+          </a:lnRef>
+          <a:fillRef idx="3">
+            <a:schemeClr val="accent5"/>
+          </a:fillRef>
+          <a:effectRef idx="3">
+            <a:schemeClr val="accent5"/>
+          </a:effectRef>
+          <a:fontRef idx="minor">
+            <a:schemeClr val="lt1"/>
+          </a:fontRef>
+        </p:style>
+        <p:txBody>
+          <a:bodyPr rtlCol="0" anchor="ctr"/>
+          <a:lstStyle/>
+          <a:p>
+            <a:pPr algn="ctr"/>
+            <a:r>
+              <a:rPr lang="en-US" sz="1200" dirty="0"/>
+              <a:t>Pipeline Systems</a:t>
+            </a:r>
+            <a:endParaRPr lang="en-CA" sz="1200" dirty="0"/>
+          </a:p>
+        </p:txBody>
+      </p:sp>
+      <p:cxnSp>
+        <p:nvCxnSpPr>
+          <p:cNvPr id="201" name="Connector: Elbow 200">
+            <a:extLst>
+              <a:ext uri="{FF2B5EF4-FFF2-40B4-BE49-F238E27FC236}">
+                <a16:creationId xmlns:a16="http://schemas.microsoft.com/office/drawing/2014/main" id="{8FB91B3D-FC40-E924-DB3A-22F450A2B389}"/>
+              </a:ext>
+            </a:extLst>
+          </p:cNvPr>
+          <p:cNvCxnSpPr>
+            <a:stCxn id="140" idx="4"/>
+            <a:endCxn id="134" idx="1"/>
+          </p:cNvCxnSpPr>
+          <p:nvPr/>
+        </p:nvCxnSpPr>
+        <p:spPr>
+          <a:xfrm>
+            <a:off x="8129329" y="4255729"/>
+            <a:ext cx="1015200" cy="1215491"/>
+          </a:xfrm>
+          <a:prstGeom prst="bentConnector3">
+            <a:avLst/>
+          </a:prstGeom>
+          <a:ln>
+            <a:tailEnd type="triangle"/>
+          </a:ln>
+        </p:spPr>
+        <p:style>
+          <a:lnRef idx="1">
+            <a:schemeClr val="accent1"/>
+          </a:lnRef>
+          <a:fillRef idx="0">
+            <a:schemeClr val="accent1"/>
+          </a:fillRef>
+          <a:effectRef idx="0">
+            <a:schemeClr val="accent1"/>
+          </a:effectRef>
+          <a:fontRef idx="minor">
+            <a:schemeClr val="tx1"/>
+          </a:fontRef>
+        </p:style>
+      </p:cxnSp>
+      <p:cxnSp>
+        <p:nvCxnSpPr>
+          <p:cNvPr id="205" name="Connector: Elbow 204">
+            <a:extLst>
+              <a:ext uri="{FF2B5EF4-FFF2-40B4-BE49-F238E27FC236}">
+                <a16:creationId xmlns:a16="http://schemas.microsoft.com/office/drawing/2014/main" id="{847D5754-A984-E390-2376-1E681731F12E}"/>
+              </a:ext>
+            </a:extLst>
+          </p:cNvPr>
+          <p:cNvCxnSpPr>
+            <a:stCxn id="140" idx="4"/>
+            <a:endCxn id="199" idx="1"/>
+          </p:cNvCxnSpPr>
+          <p:nvPr/>
+        </p:nvCxnSpPr>
+        <p:spPr>
+          <a:xfrm>
+            <a:off x="8129329" y="4255729"/>
+            <a:ext cx="1015200" cy="1732113"/>
+          </a:xfrm>
+          <a:prstGeom prst="bentConnector3">
+            <a:avLst/>
+          </a:prstGeom>
+          <a:ln>
+            <a:tailEnd type="triangle"/>
+          </a:ln>
+        </p:spPr>
+        <p:style>
+          <a:lnRef idx="1">
+            <a:schemeClr val="accent1"/>
+          </a:lnRef>
+          <a:fillRef idx="0">
+            <a:schemeClr val="accent1"/>
+          </a:fillRef>
+          <a:effectRef idx="0">
+            <a:schemeClr val="accent1"/>
+          </a:effectRef>
+          <a:fontRef idx="minor">
+            <a:schemeClr val="tx1"/>
+          </a:fontRef>
+        </p:style>
+      </p:cxnSp>
+      <p:cxnSp>
+        <p:nvCxnSpPr>
+          <p:cNvPr id="211" name="Connector: Elbow 210">
+            <a:extLst>
+              <a:ext uri="{FF2B5EF4-FFF2-40B4-BE49-F238E27FC236}">
+                <a16:creationId xmlns:a16="http://schemas.microsoft.com/office/drawing/2014/main" id="{10085767-F9C0-84C2-4059-AE81563E837D}"/>
+              </a:ext>
+            </a:extLst>
+          </p:cNvPr>
+          <p:cNvCxnSpPr>
+            <a:stCxn id="241" idx="3"/>
+            <a:endCxn id="302" idx="1"/>
+          </p:cNvCxnSpPr>
+          <p:nvPr/>
+        </p:nvCxnSpPr>
+        <p:spPr>
+          <a:xfrm>
+            <a:off x="10494607" y="3706627"/>
+            <a:ext cx="233540" cy="846365"/>
+          </a:xfrm>
+          <a:prstGeom prst="bentConnector3">
+            <a:avLst/>
+          </a:prstGeom>
+          <a:ln>
+            <a:tailEnd type="triangle"/>
+          </a:ln>
+        </p:spPr>
+        <p:style>
+          <a:lnRef idx="1">
+            <a:schemeClr val="accent1"/>
+          </a:lnRef>
+          <a:fillRef idx="0">
+            <a:schemeClr val="accent1"/>
+          </a:fillRef>
+          <a:effectRef idx="0">
+            <a:schemeClr val="accent1"/>
+          </a:effectRef>
+          <a:fontRef idx="minor">
+            <a:schemeClr val="tx1"/>
+          </a:fontRef>
+        </p:style>
+      </p:cxnSp>
+      <p:cxnSp>
+        <p:nvCxnSpPr>
+          <p:cNvPr id="213" name="Connector: Elbow 212">
+            <a:extLst>
+              <a:ext uri="{FF2B5EF4-FFF2-40B4-BE49-F238E27FC236}">
+                <a16:creationId xmlns:a16="http://schemas.microsoft.com/office/drawing/2014/main" id="{C37F8384-7C99-0BD1-743A-51C3057324B3}"/>
+              </a:ext>
+            </a:extLst>
+          </p:cNvPr>
+          <p:cNvCxnSpPr>
+            <a:stCxn id="95" idx="3"/>
+            <a:endCxn id="302" idx="1"/>
+          </p:cNvCxnSpPr>
+          <p:nvPr/>
+        </p:nvCxnSpPr>
+        <p:spPr>
+          <a:xfrm>
+            <a:off x="10494607" y="4407071"/>
+            <a:ext cx="233540" cy="145921"/>
+          </a:xfrm>
+          <a:prstGeom prst="bentConnector3">
+            <a:avLst/>
+          </a:prstGeom>
+          <a:ln>
+            <a:tailEnd type="triangle"/>
+          </a:ln>
+        </p:spPr>
+        <p:style>
+          <a:lnRef idx="1">
+            <a:schemeClr val="accent1"/>
+          </a:lnRef>
+          <a:fillRef idx="0">
+            <a:schemeClr val="accent1"/>
+          </a:fillRef>
+          <a:effectRef idx="0">
+            <a:schemeClr val="accent1"/>
+          </a:effectRef>
+          <a:fontRef idx="minor">
+            <a:schemeClr val="tx1"/>
+          </a:fontRef>
+        </p:style>
+      </p:cxnSp>
+      <p:cxnSp>
+        <p:nvCxnSpPr>
+          <p:cNvPr id="216" name="Connector: Elbow 215">
+            <a:extLst>
+              <a:ext uri="{FF2B5EF4-FFF2-40B4-BE49-F238E27FC236}">
+                <a16:creationId xmlns:a16="http://schemas.microsoft.com/office/drawing/2014/main" id="{BF13AE4D-0AFF-EE6F-7F2A-58305C934AE4}"/>
+              </a:ext>
+            </a:extLst>
+          </p:cNvPr>
+          <p:cNvCxnSpPr>
+            <a:stCxn id="104" idx="3"/>
+            <a:endCxn id="302" idx="1"/>
+          </p:cNvCxnSpPr>
+          <p:nvPr/>
+        </p:nvCxnSpPr>
+        <p:spPr>
+          <a:xfrm flipV="1">
+            <a:off x="10491274" y="4552992"/>
+            <a:ext cx="236873" cy="191870"/>
+          </a:xfrm>
+          <a:prstGeom prst="bentConnector3">
+            <a:avLst/>
+          </a:prstGeom>
+          <a:ln>
+            <a:tailEnd type="triangle"/>
+          </a:ln>
+        </p:spPr>
+        <p:style>
+          <a:lnRef idx="1">
+            <a:schemeClr val="accent1"/>
+          </a:lnRef>
+          <a:fillRef idx="0">
+            <a:schemeClr val="accent1"/>
+          </a:fillRef>
+          <a:effectRef idx="0">
+            <a:schemeClr val="accent1"/>
+          </a:effectRef>
+          <a:fontRef idx="minor">
+            <a:schemeClr val="tx1"/>
+          </a:fontRef>
+        </p:style>
+      </p:cxnSp>
     </p:spTree>
     <p:extLst>
       <p:ext uri="{BB962C8B-B14F-4D97-AF65-F5344CB8AC3E}">

</xml_diff>

<commit_message>
expanded to include more possible systems as examples
</commit_message>
<xml_diff>
--- a/doc/ShotgridORM.pptx
+++ b/doc/ShotgridORM.pptx
@@ -261,7 +261,7 @@
           <a:p>
             <a:fld id="{00BE8D59-02A0-432D-960C-C8D1F28C55FA}" type="datetimeFigureOut">
               <a:rPr lang="en-CA" smtClean="0"/>
-              <a:t>2024-03-29</a:t>
+              <a:t>2025-02-08</a:t>
             </a:fld>
             <a:endParaRPr lang="en-CA"/>
           </a:p>
@@ -461,7 +461,7 @@
           <a:p>
             <a:fld id="{00BE8D59-02A0-432D-960C-C8D1F28C55FA}" type="datetimeFigureOut">
               <a:rPr lang="en-CA" smtClean="0"/>
-              <a:t>2024-03-29</a:t>
+              <a:t>2025-02-08</a:t>
             </a:fld>
             <a:endParaRPr lang="en-CA"/>
           </a:p>
@@ -671,7 +671,7 @@
           <a:p>
             <a:fld id="{00BE8D59-02A0-432D-960C-C8D1F28C55FA}" type="datetimeFigureOut">
               <a:rPr lang="en-CA" smtClean="0"/>
-              <a:t>2024-03-29</a:t>
+              <a:t>2025-02-08</a:t>
             </a:fld>
             <a:endParaRPr lang="en-CA"/>
           </a:p>
@@ -871,7 +871,7 @@
           <a:p>
             <a:fld id="{00BE8D59-02A0-432D-960C-C8D1F28C55FA}" type="datetimeFigureOut">
               <a:rPr lang="en-CA" smtClean="0"/>
-              <a:t>2024-03-29</a:t>
+              <a:t>2025-02-08</a:t>
             </a:fld>
             <a:endParaRPr lang="en-CA"/>
           </a:p>
@@ -1147,7 +1147,7 @@
           <a:p>
             <a:fld id="{00BE8D59-02A0-432D-960C-C8D1F28C55FA}" type="datetimeFigureOut">
               <a:rPr lang="en-CA" smtClean="0"/>
-              <a:t>2024-03-29</a:t>
+              <a:t>2025-02-08</a:t>
             </a:fld>
             <a:endParaRPr lang="en-CA"/>
           </a:p>
@@ -1415,7 +1415,7 @@
           <a:p>
             <a:fld id="{00BE8D59-02A0-432D-960C-C8D1F28C55FA}" type="datetimeFigureOut">
               <a:rPr lang="en-CA" smtClean="0"/>
-              <a:t>2024-03-29</a:t>
+              <a:t>2025-02-08</a:t>
             </a:fld>
             <a:endParaRPr lang="en-CA"/>
           </a:p>
@@ -1830,7 +1830,7 @@
           <a:p>
             <a:fld id="{00BE8D59-02A0-432D-960C-C8D1F28C55FA}" type="datetimeFigureOut">
               <a:rPr lang="en-CA" smtClean="0"/>
-              <a:t>2024-03-29</a:t>
+              <a:t>2025-02-08</a:t>
             </a:fld>
             <a:endParaRPr lang="en-CA"/>
           </a:p>
@@ -1972,7 +1972,7 @@
           <a:p>
             <a:fld id="{00BE8D59-02A0-432D-960C-C8D1F28C55FA}" type="datetimeFigureOut">
               <a:rPr lang="en-CA" smtClean="0"/>
-              <a:t>2024-03-29</a:t>
+              <a:t>2025-02-08</a:t>
             </a:fld>
             <a:endParaRPr lang="en-CA"/>
           </a:p>
@@ -2085,7 +2085,7 @@
           <a:p>
             <a:fld id="{00BE8D59-02A0-432D-960C-C8D1F28C55FA}" type="datetimeFigureOut">
               <a:rPr lang="en-CA" smtClean="0"/>
-              <a:t>2024-03-29</a:t>
+              <a:t>2025-02-08</a:t>
             </a:fld>
             <a:endParaRPr lang="en-CA"/>
           </a:p>
@@ -2398,7 +2398,7 @@
           <a:p>
             <a:fld id="{00BE8D59-02A0-432D-960C-C8D1F28C55FA}" type="datetimeFigureOut">
               <a:rPr lang="en-CA" smtClean="0"/>
-              <a:t>2024-03-29</a:t>
+              <a:t>2025-02-08</a:t>
             </a:fld>
             <a:endParaRPr lang="en-CA"/>
           </a:p>
@@ -2687,7 +2687,7 @@
           <a:p>
             <a:fld id="{00BE8D59-02A0-432D-960C-C8D1F28C55FA}" type="datetimeFigureOut">
               <a:rPr lang="en-CA" smtClean="0"/>
-              <a:t>2024-03-29</a:t>
+              <a:t>2025-02-08</a:t>
             </a:fld>
             <a:endParaRPr lang="en-CA"/>
           </a:p>
@@ -2930,7 +2930,7 @@
           <a:p>
             <a:fld id="{00BE8D59-02A0-432D-960C-C8D1F28C55FA}" type="datetimeFigureOut">
               <a:rPr lang="en-CA" smtClean="0"/>
-              <a:t>2024-03-29</a:t>
+              <a:t>2025-02-08</a:t>
             </a:fld>
             <a:endParaRPr lang="en-CA"/>
           </a:p>
@@ -4948,7 +4948,7 @@
         <p:spPr>
           <a:xfrm>
             <a:off x="9609363" y="1086824"/>
-            <a:ext cx="0" cy="277331"/>
+            <a:ext cx="0" cy="203327"/>
           </a:xfrm>
           <a:prstGeom prst="straightConnector1">
             <a:avLst/>
@@ -5436,8 +5436,8 @@
         </p:nvSpPr>
         <p:spPr>
           <a:xfrm>
-            <a:off x="9144529" y="3031244"/>
-            <a:ext cx="1350078" cy="381930"/>
+            <a:off x="8910308" y="2840620"/>
+            <a:ext cx="1584299" cy="293766"/>
           </a:xfrm>
           <a:prstGeom prst="flowChartPredefinedProcess">
             <a:avLst/>
@@ -5463,14 +5463,14 @@
           <a:p>
             <a:pPr algn="ctr"/>
             <a:r>
-              <a:rPr lang="en-US" sz="1200" dirty="0"/>
+              <a:rPr lang="en-US" sz="900" dirty="0"/>
               <a:t>Microsoft </a:t>
             </a:r>
             <a:r>
-              <a:rPr lang="en-US" sz="1200" dirty="0" err="1"/>
+              <a:rPr lang="en-US" sz="900" dirty="0" err="1"/>
               <a:t>PowerBI</a:t>
             </a:r>
-            <a:endParaRPr lang="en-CA" sz="1200" dirty="0"/>
+            <a:endParaRPr lang="en-CA" sz="900" dirty="0"/>
           </a:p>
         </p:txBody>
       </p:sp>
@@ -5488,8 +5488,8 @@
         </p:nvSpPr>
         <p:spPr>
           <a:xfrm>
-            <a:off x="9144529" y="3515662"/>
-            <a:ext cx="1350078" cy="381930"/>
+            <a:off x="8922359" y="3180565"/>
+            <a:ext cx="1572248" cy="295517"/>
           </a:xfrm>
           <a:prstGeom prst="flowChartPredefinedProcess">
             <a:avLst/>
@@ -5515,14 +5515,14 @@
           <a:p>
             <a:pPr algn="ctr"/>
             <a:r>
-              <a:rPr lang="en-US" sz="1200" dirty="0"/>
+              <a:rPr lang="en-US" sz="900" dirty="0"/>
               <a:t>Apache </a:t>
             </a:r>
             <a:r>
-              <a:rPr lang="en-US" sz="1200" dirty="0" err="1"/>
+              <a:rPr lang="en-US" sz="900" dirty="0" err="1"/>
               <a:t>SuperSet</a:t>
             </a:r>
-            <a:endParaRPr lang="en-CA" sz="1200" dirty="0"/>
+            <a:endParaRPr lang="en-CA" sz="900" dirty="0"/>
           </a:p>
         </p:txBody>
       </p:sp>
@@ -5544,12 +5544,12 @@
         </p:nvCxnSpPr>
         <p:spPr>
           <a:xfrm flipV="1">
-            <a:off x="8129329" y="3706627"/>
-            <a:ext cx="1015200" cy="549102"/>
+            <a:off x="8129329" y="3328324"/>
+            <a:ext cx="793030" cy="927405"/>
           </a:xfrm>
           <a:prstGeom prst="bentConnector3">
             <a:avLst>
-              <a:gd name="adj1" fmla="val 50000"/>
+              <a:gd name="adj1" fmla="val 63330"/>
             </a:avLst>
           </a:prstGeom>
           <a:ln>
@@ -5771,7 +5771,7 @@
         </p:nvSpPr>
         <p:spPr>
           <a:xfrm>
-            <a:off x="9051737" y="1364155"/>
+            <a:off x="9051737" y="1290151"/>
             <a:ext cx="1115251" cy="303002"/>
           </a:xfrm>
           <a:prstGeom prst="flowChartProcess">
@@ -5982,8 +5982,8 @@
         </p:nvCxnSpPr>
         <p:spPr>
           <a:xfrm rot="10800000" flipV="1">
-            <a:off x="7833339" y="1515656"/>
-            <a:ext cx="1218399" cy="1692034"/>
+            <a:off x="7833339" y="1441652"/>
+            <a:ext cx="1218399" cy="1766038"/>
           </a:xfrm>
           <a:prstGeom prst="bentConnector2">
             <a:avLst/>
@@ -6074,8 +6074,8 @@
         </p:nvSpPr>
         <p:spPr>
           <a:xfrm>
-            <a:off x="9144529" y="3978881"/>
-            <a:ext cx="1350078" cy="237225"/>
+            <a:off x="8922359" y="3532639"/>
+            <a:ext cx="1572248" cy="295517"/>
           </a:xfrm>
           <a:prstGeom prst="flowChartPredefinedProcess">
             <a:avLst/>
@@ -6101,10 +6101,10 @@
           <a:p>
             <a:pPr algn="ctr"/>
             <a:r>
-              <a:rPr lang="en-US" sz="1200" dirty="0"/>
+              <a:rPr lang="en-US" sz="900" dirty="0"/>
               <a:t>Tableau</a:t>
             </a:r>
-            <a:endParaRPr lang="en-CA" sz="1200" dirty="0"/>
+            <a:endParaRPr lang="en-CA" sz="900" dirty="0"/>
           </a:p>
         </p:txBody>
       </p:sp>
@@ -6122,8 +6122,8 @@
         </p:nvSpPr>
         <p:spPr>
           <a:xfrm>
-            <a:off x="9144529" y="4288458"/>
-            <a:ext cx="1350078" cy="237225"/>
+            <a:off x="8922359" y="3892020"/>
+            <a:ext cx="1572248" cy="301536"/>
           </a:xfrm>
           <a:prstGeom prst="flowChartPredefinedProcess">
             <a:avLst/>
@@ -6149,10 +6149,10 @@
           <a:p>
             <a:pPr algn="ctr"/>
             <a:r>
-              <a:rPr lang="en-US" sz="1200" dirty="0"/>
+              <a:rPr lang="en-US" sz="900" dirty="0"/>
               <a:t>Looker</a:t>
             </a:r>
-            <a:endParaRPr lang="en-CA" sz="1200" dirty="0"/>
+            <a:endParaRPr lang="en-CA" sz="900" dirty="0"/>
           </a:p>
         </p:txBody>
       </p:sp>
@@ -6170,8 +6170,8 @@
         </p:nvSpPr>
         <p:spPr>
           <a:xfrm>
-            <a:off x="9141196" y="4626249"/>
-            <a:ext cx="1350078" cy="237225"/>
+            <a:off x="8926895" y="4250955"/>
+            <a:ext cx="1564380" cy="241353"/>
           </a:xfrm>
           <a:prstGeom prst="flowChartPredefinedProcess">
             <a:avLst/>
@@ -6197,9 +6197,10 @@
           <a:p>
             <a:pPr algn="ctr"/>
             <a:r>
-              <a:rPr lang="en-CA" sz="1200" dirty="0"/>
-              <a:t>…</a:t>
-            </a:r>
+              <a:rPr lang="en-CA" sz="900" dirty="0" err="1"/>
+              <a:t>Streamlit</a:t>
+            </a:r>
+            <a:endParaRPr lang="en-CA" sz="900" dirty="0"/>
           </a:p>
         </p:txBody>
       </p:sp>
@@ -6213,6 +6214,7 @@
             </a:extLst>
           </p:cNvPr>
           <p:cNvCxnSpPr>
+            <a:cxnSpLocks/>
             <a:stCxn id="140" idx="4"/>
             <a:endCxn id="240" idx="1"/>
           </p:cNvCxnSpPr>
@@ -6220,11 +6222,13 @@
         </p:nvCxnSpPr>
         <p:spPr>
           <a:xfrm flipV="1">
-            <a:off x="8129329" y="3222209"/>
-            <a:ext cx="1015200" cy="1033520"/>
+            <a:off x="8129329" y="2987503"/>
+            <a:ext cx="780979" cy="1268226"/>
           </a:xfrm>
           <a:prstGeom prst="bentConnector3">
-            <a:avLst/>
+            <a:avLst>
+              <a:gd name="adj1" fmla="val 64213"/>
+            </a:avLst>
           </a:prstGeom>
           <a:ln>
             <a:tailEnd type="triangle"/>
@@ -6255,6 +6259,7 @@
             </a:extLst>
           </p:cNvPr>
           <p:cNvCxnSpPr>
+            <a:cxnSpLocks/>
             <a:stCxn id="140" idx="4"/>
             <a:endCxn id="94" idx="1"/>
           </p:cNvCxnSpPr>
@@ -6262,11 +6267,13 @@
         </p:nvCxnSpPr>
         <p:spPr>
           <a:xfrm flipV="1">
-            <a:off x="8129329" y="4097494"/>
-            <a:ext cx="1015200" cy="158235"/>
+            <a:off x="8129329" y="3680398"/>
+            <a:ext cx="793030" cy="575331"/>
           </a:xfrm>
           <a:prstGeom prst="bentConnector3">
-            <a:avLst/>
+            <a:avLst>
+              <a:gd name="adj1" fmla="val 63330"/>
+            </a:avLst>
           </a:prstGeom>
           <a:ln>
             <a:tailEnd type="triangle"/>
@@ -6297,18 +6304,21 @@
             </a:extLst>
           </p:cNvPr>
           <p:cNvCxnSpPr>
+            <a:cxnSpLocks/>
             <a:stCxn id="140" idx="4"/>
             <a:endCxn id="95" idx="1"/>
           </p:cNvCxnSpPr>
           <p:nvPr/>
         </p:nvCxnSpPr>
         <p:spPr>
-          <a:xfrm>
-            <a:off x="8129329" y="4255729"/>
-            <a:ext cx="1015200" cy="151342"/>
+          <a:xfrm flipV="1">
+            <a:off x="8129329" y="4042788"/>
+            <a:ext cx="793030" cy="212941"/>
           </a:xfrm>
           <a:prstGeom prst="bentConnector3">
-            <a:avLst/>
+            <a:avLst>
+              <a:gd name="adj1" fmla="val 63330"/>
+            </a:avLst>
           </a:prstGeom>
           <a:ln>
             <a:tailEnd type="triangle"/>
@@ -6339,6 +6349,7 @@
             </a:extLst>
           </p:cNvPr>
           <p:cNvCxnSpPr>
+            <a:cxnSpLocks/>
             <a:stCxn id="140" idx="4"/>
             <a:endCxn id="104" idx="1"/>
           </p:cNvCxnSpPr>
@@ -6347,10 +6358,12 @@
         <p:spPr>
           <a:xfrm>
             <a:off x="8129329" y="4255729"/>
-            <a:ext cx="1011867" cy="489133"/>
+            <a:ext cx="797566" cy="115903"/>
           </a:xfrm>
           <a:prstGeom prst="bentConnector3">
-            <a:avLst/>
+            <a:avLst>
+              <a:gd name="adj1" fmla="val 62592"/>
+            </a:avLst>
           </a:prstGeom>
           <a:ln>
             <a:tailEnd type="triangle"/>
@@ -6651,8 +6664,8 @@
         </p:nvSpPr>
         <p:spPr>
           <a:xfrm>
-            <a:off x="3839170" y="6467553"/>
-            <a:ext cx="2340618" cy="317500"/>
+            <a:off x="3839169" y="6467553"/>
+            <a:ext cx="3232895" cy="317500"/>
           </a:xfrm>
           <a:prstGeom prst="rect">
             <a:avLst/>
@@ -6833,7 +6846,7 @@
             </a:pPr>
             <a:r>
               <a:rPr lang="en-US" sz="1800" dirty="0"/>
-              <a:t>John E. Tran, 2024</a:t>
+              <a:t>John E. Tran, 2024-Present</a:t>
             </a:r>
             <a:endParaRPr lang="en-CA" sz="1800" dirty="0"/>
           </a:p>
@@ -6853,8 +6866,8 @@
         </p:nvSpPr>
         <p:spPr>
           <a:xfrm>
-            <a:off x="9144529" y="5280255"/>
-            <a:ext cx="1350078" cy="381930"/>
+            <a:off x="9012195" y="5343690"/>
+            <a:ext cx="1482412" cy="304730"/>
           </a:xfrm>
           <a:prstGeom prst="flowChartPredefinedProcess">
             <a:avLst/>
@@ -6880,10 +6893,10 @@
           <a:p>
             <a:pPr algn="ctr"/>
             <a:r>
-              <a:rPr lang="en-US" sz="1200" dirty="0"/>
+              <a:rPr lang="en-US" sz="900" dirty="0"/>
               <a:t>Business Systems</a:t>
             </a:r>
-            <a:endParaRPr lang="en-CA" sz="1200" dirty="0"/>
+            <a:endParaRPr lang="en-CA" sz="900" dirty="0"/>
           </a:p>
         </p:txBody>
       </p:sp>
@@ -6897,6 +6910,7 @@
             </a:extLst>
           </p:cNvPr>
           <p:cNvCxnSpPr>
+            <a:cxnSpLocks/>
             <a:stCxn id="240" idx="3"/>
             <a:endCxn id="293" idx="1"/>
           </p:cNvCxnSpPr>
@@ -6904,8 +6918,8 @@
         </p:nvCxnSpPr>
         <p:spPr>
           <a:xfrm>
-            <a:off x="10494607" y="3222209"/>
-            <a:ext cx="236873" cy="144859"/>
+            <a:off x="10494607" y="2987503"/>
+            <a:ext cx="236873" cy="379565"/>
           </a:xfrm>
           <a:prstGeom prst="bentConnector3">
             <a:avLst/>
@@ -6939,15 +6953,16 @@
             </a:extLst>
           </p:cNvPr>
           <p:cNvCxnSpPr>
+            <a:cxnSpLocks/>
             <a:stCxn id="241" idx="3"/>
             <a:endCxn id="293" idx="1"/>
           </p:cNvCxnSpPr>
           <p:nvPr/>
         </p:nvCxnSpPr>
         <p:spPr>
-          <a:xfrm flipV="1">
-            <a:off x="10494607" y="3367068"/>
-            <a:ext cx="236873" cy="339559"/>
+          <a:xfrm>
+            <a:off x="10494607" y="3328324"/>
+            <a:ext cx="236873" cy="38744"/>
           </a:xfrm>
           <a:prstGeom prst="bentConnector3">
             <a:avLst/>
@@ -6981,6 +6996,7 @@
             </a:extLst>
           </p:cNvPr>
           <p:cNvCxnSpPr>
+            <a:cxnSpLocks/>
             <a:stCxn id="94" idx="3"/>
             <a:endCxn id="293" idx="1"/>
           </p:cNvCxnSpPr>
@@ -6989,10 +7005,12 @@
         <p:spPr>
           <a:xfrm flipV="1">
             <a:off x="10494607" y="3367068"/>
-            <a:ext cx="236873" cy="730426"/>
+            <a:ext cx="236873" cy="313330"/>
           </a:xfrm>
           <a:prstGeom prst="bentConnector3">
-            <a:avLst/>
+            <a:avLst>
+              <a:gd name="adj1" fmla="val 50001"/>
+            </a:avLst>
           </a:prstGeom>
           <a:ln>
             <a:tailEnd type="triangle"/>
@@ -7027,8 +7045,8 @@
         </p:nvSpPr>
         <p:spPr>
           <a:xfrm>
-            <a:off x="9144529" y="5796877"/>
-            <a:ext cx="1350078" cy="381930"/>
+            <a:off x="9012195" y="5733446"/>
+            <a:ext cx="1482412" cy="300540"/>
           </a:xfrm>
           <a:prstGeom prst="flowChartPredefinedProcess">
             <a:avLst/>
@@ -7054,10 +7072,10 @@
           <a:p>
             <a:pPr algn="ctr"/>
             <a:r>
-              <a:rPr lang="en-US" sz="1200" dirty="0"/>
+              <a:rPr lang="en-US" sz="900" dirty="0"/>
               <a:t>Pipeline Systems</a:t>
             </a:r>
-            <a:endParaRPr lang="en-CA" sz="1200" dirty="0"/>
+            <a:endParaRPr lang="en-CA" sz="900" dirty="0"/>
           </a:p>
         </p:txBody>
       </p:sp>
@@ -7071,6 +7089,7 @@
             </a:extLst>
           </p:cNvPr>
           <p:cNvCxnSpPr>
+            <a:cxnSpLocks/>
             <a:stCxn id="140" idx="4"/>
             <a:endCxn id="134" idx="1"/>
           </p:cNvCxnSpPr>
@@ -7079,10 +7098,12 @@
         <p:spPr>
           <a:xfrm>
             <a:off x="8129329" y="4255729"/>
-            <a:ext cx="1015200" cy="1215491"/>
+            <a:ext cx="882866" cy="1240326"/>
           </a:xfrm>
           <a:prstGeom prst="bentConnector3">
-            <a:avLst/>
+            <a:avLst>
+              <a:gd name="adj1" fmla="val 56585"/>
+            </a:avLst>
           </a:prstGeom>
           <a:ln>
             <a:tailEnd type="triangle"/>
@@ -7113,6 +7134,7 @@
             </a:extLst>
           </p:cNvPr>
           <p:cNvCxnSpPr>
+            <a:cxnSpLocks/>
             <a:stCxn id="140" idx="4"/>
             <a:endCxn id="199" idx="1"/>
           </p:cNvCxnSpPr>
@@ -7121,10 +7143,12 @@
         <p:spPr>
           <a:xfrm>
             <a:off x="8129329" y="4255729"/>
-            <a:ext cx="1015200" cy="1732113"/>
+            <a:ext cx="882866" cy="1627987"/>
           </a:xfrm>
           <a:prstGeom prst="bentConnector3">
-            <a:avLst/>
+            <a:avLst>
+              <a:gd name="adj1" fmla="val 56585"/>
+            </a:avLst>
           </a:prstGeom>
           <a:ln>
             <a:tailEnd type="triangle"/>
@@ -7155,6 +7179,7 @@
             </a:extLst>
           </p:cNvPr>
           <p:cNvCxnSpPr>
+            <a:cxnSpLocks/>
             <a:stCxn id="241" idx="3"/>
             <a:endCxn id="302" idx="1"/>
           </p:cNvCxnSpPr>
@@ -7162,8 +7187,8 @@
         </p:nvCxnSpPr>
         <p:spPr>
           <a:xfrm>
-            <a:off x="10494607" y="3706627"/>
-            <a:ext cx="233540" cy="846365"/>
+            <a:off x="10494607" y="3328324"/>
+            <a:ext cx="233540" cy="1224668"/>
           </a:xfrm>
           <a:prstGeom prst="bentConnector3">
             <a:avLst/>
@@ -7197,6 +7222,7 @@
             </a:extLst>
           </p:cNvPr>
           <p:cNvCxnSpPr>
+            <a:cxnSpLocks/>
             <a:stCxn id="95" idx="3"/>
             <a:endCxn id="302" idx="1"/>
           </p:cNvCxnSpPr>
@@ -7204,8 +7230,8 @@
         </p:nvCxnSpPr>
         <p:spPr>
           <a:xfrm>
-            <a:off x="10494607" y="4407071"/>
-            <a:ext cx="233540" cy="145921"/>
+            <a:off x="10494607" y="4042788"/>
+            <a:ext cx="233540" cy="510204"/>
           </a:xfrm>
           <a:prstGeom prst="bentConnector3">
             <a:avLst/>
@@ -7239,18 +7265,536 @@
             </a:extLst>
           </p:cNvPr>
           <p:cNvCxnSpPr>
+            <a:cxnSpLocks/>
             <a:stCxn id="104" idx="3"/>
             <a:endCxn id="302" idx="1"/>
           </p:cNvCxnSpPr>
           <p:nvPr/>
         </p:nvCxnSpPr>
         <p:spPr>
-          <a:xfrm flipV="1">
-            <a:off x="10491274" y="4552992"/>
-            <a:ext cx="236873" cy="191870"/>
+          <a:xfrm>
+            <a:off x="10491275" y="4371632"/>
+            <a:ext cx="236872" cy="181360"/>
           </a:xfrm>
           <a:prstGeom prst="bentConnector3">
             <a:avLst/>
+          </a:prstGeom>
+          <a:ln>
+            <a:tailEnd type="triangle"/>
+          </a:ln>
+        </p:spPr>
+        <p:style>
+          <a:lnRef idx="1">
+            <a:schemeClr val="accent1"/>
+          </a:lnRef>
+          <a:fillRef idx="0">
+            <a:schemeClr val="accent1"/>
+          </a:fillRef>
+          <a:effectRef idx="0">
+            <a:schemeClr val="accent1"/>
+          </a:effectRef>
+          <a:fontRef idx="minor">
+            <a:schemeClr val="tx1"/>
+          </a:fontRef>
+        </p:style>
+      </p:cxnSp>
+      <p:sp>
+        <p:nvSpPr>
+          <p:cNvPr id="3" name="Flowchart: Predefined Process 2">
+            <a:extLst>
+              <a:ext uri="{FF2B5EF4-FFF2-40B4-BE49-F238E27FC236}">
+                <a16:creationId xmlns:a16="http://schemas.microsoft.com/office/drawing/2014/main" id="{58B5419F-6BEC-C3D1-8BB1-D494C424323F}"/>
+              </a:ext>
+            </a:extLst>
+          </p:cNvPr>
+          <p:cNvSpPr/>
+          <p:nvPr/>
+        </p:nvSpPr>
+        <p:spPr>
+          <a:xfrm>
+            <a:off x="8911035" y="1920521"/>
+            <a:ext cx="1576149" cy="308274"/>
+          </a:xfrm>
+          <a:prstGeom prst="flowChartPredefinedProcess">
+            <a:avLst/>
+          </a:prstGeom>
+          <a:solidFill>
+            <a:schemeClr val="accent5">
+              <a:lumMod val="50000"/>
+            </a:schemeClr>
+          </a:solidFill>
+        </p:spPr>
+        <p:style>
+          <a:lnRef idx="0">
+            <a:schemeClr val="accent5"/>
+          </a:lnRef>
+          <a:fillRef idx="3">
+            <a:schemeClr val="accent5"/>
+          </a:fillRef>
+          <a:effectRef idx="3">
+            <a:schemeClr val="accent5"/>
+          </a:effectRef>
+          <a:fontRef idx="minor">
+            <a:schemeClr val="lt1"/>
+          </a:fontRef>
+        </p:style>
+        <p:txBody>
+          <a:bodyPr rtlCol="0" anchor="ctr"/>
+          <a:lstStyle/>
+          <a:p>
+            <a:pPr algn="ctr"/>
+            <a:r>
+              <a:rPr lang="en-US" sz="900" dirty="0"/>
+              <a:t>Data Science</a:t>
+            </a:r>
+            <a:endParaRPr lang="en-CA" sz="900" dirty="0"/>
+          </a:p>
+        </p:txBody>
+      </p:sp>
+      <p:cxnSp>
+        <p:nvCxnSpPr>
+          <p:cNvPr id="5" name="Connector: Elbow 4">
+            <a:extLst>
+              <a:ext uri="{FF2B5EF4-FFF2-40B4-BE49-F238E27FC236}">
+                <a16:creationId xmlns:a16="http://schemas.microsoft.com/office/drawing/2014/main" id="{3D2C70C7-FD91-C5AB-7A65-D989C4AC10FF}"/>
+              </a:ext>
+            </a:extLst>
+          </p:cNvPr>
+          <p:cNvCxnSpPr>
+            <a:cxnSpLocks/>
+            <a:endCxn id="9" idx="1"/>
+          </p:cNvCxnSpPr>
+          <p:nvPr/>
+        </p:nvCxnSpPr>
+        <p:spPr>
+          <a:xfrm rot="5400000" flipH="1" flipV="1">
+            <a:off x="7860771" y="3219414"/>
+            <a:ext cx="1819087" cy="282246"/>
+          </a:xfrm>
+          <a:prstGeom prst="bentConnector2">
+            <a:avLst/>
+          </a:prstGeom>
+          <a:ln>
+            <a:tailEnd type="triangle"/>
+          </a:ln>
+        </p:spPr>
+        <p:style>
+          <a:lnRef idx="1">
+            <a:schemeClr val="accent1"/>
+          </a:lnRef>
+          <a:fillRef idx="0">
+            <a:schemeClr val="accent1"/>
+          </a:fillRef>
+          <a:effectRef idx="0">
+            <a:schemeClr val="accent1"/>
+          </a:effectRef>
+          <a:fontRef idx="minor">
+            <a:schemeClr val="tx1"/>
+          </a:fontRef>
+        </p:style>
+      </p:cxnSp>
+      <p:sp>
+        <p:nvSpPr>
+          <p:cNvPr id="9" name="Flowchart: Predefined Process 8">
+            <a:extLst>
+              <a:ext uri="{FF2B5EF4-FFF2-40B4-BE49-F238E27FC236}">
+                <a16:creationId xmlns:a16="http://schemas.microsoft.com/office/drawing/2014/main" id="{02009D79-0102-9E5C-341F-C4E688864E24}"/>
+              </a:ext>
+            </a:extLst>
+          </p:cNvPr>
+          <p:cNvSpPr/>
+          <p:nvPr/>
+        </p:nvSpPr>
+        <p:spPr>
+          <a:xfrm>
+            <a:off x="8911437" y="2299492"/>
+            <a:ext cx="1571658" cy="303002"/>
+          </a:xfrm>
+          <a:prstGeom prst="flowChartPredefinedProcess">
+            <a:avLst/>
+          </a:prstGeom>
+          <a:solidFill>
+            <a:schemeClr val="accent5">
+              <a:lumMod val="50000"/>
+            </a:schemeClr>
+          </a:solidFill>
+        </p:spPr>
+        <p:style>
+          <a:lnRef idx="0">
+            <a:schemeClr val="accent5"/>
+          </a:lnRef>
+          <a:fillRef idx="3">
+            <a:schemeClr val="accent5"/>
+          </a:fillRef>
+          <a:effectRef idx="3">
+            <a:schemeClr val="accent5"/>
+          </a:effectRef>
+          <a:fontRef idx="minor">
+            <a:schemeClr val="lt1"/>
+          </a:fontRef>
+        </p:style>
+        <p:txBody>
+          <a:bodyPr rtlCol="0" anchor="ctr"/>
+          <a:lstStyle/>
+          <a:p>
+            <a:pPr algn="ctr"/>
+            <a:r>
+              <a:rPr lang="en-US" sz="900" dirty="0"/>
+              <a:t>Machine Learning/AI</a:t>
+            </a:r>
+            <a:endParaRPr lang="en-CA" sz="900" dirty="0"/>
+          </a:p>
+        </p:txBody>
+      </p:sp>
+      <p:sp>
+        <p:nvSpPr>
+          <p:cNvPr id="109" name="Flowchart: Predefined Process 108">
+            <a:extLst>
+              <a:ext uri="{FF2B5EF4-FFF2-40B4-BE49-F238E27FC236}">
+                <a16:creationId xmlns:a16="http://schemas.microsoft.com/office/drawing/2014/main" id="{8F4E97B5-64BA-8E06-34F5-E9B023E82B6C}"/>
+              </a:ext>
+            </a:extLst>
+          </p:cNvPr>
+          <p:cNvSpPr/>
+          <p:nvPr/>
+        </p:nvSpPr>
+        <p:spPr>
+          <a:xfrm>
+            <a:off x="8926895" y="4550924"/>
+            <a:ext cx="1564380" cy="241353"/>
+          </a:xfrm>
+          <a:prstGeom prst="flowChartPredefinedProcess">
+            <a:avLst/>
+          </a:prstGeom>
+        </p:spPr>
+        <p:style>
+          <a:lnRef idx="1">
+            <a:schemeClr val="accent1"/>
+          </a:lnRef>
+          <a:fillRef idx="2">
+            <a:schemeClr val="accent1"/>
+          </a:fillRef>
+          <a:effectRef idx="1">
+            <a:schemeClr val="accent1"/>
+          </a:effectRef>
+          <a:fontRef idx="minor">
+            <a:schemeClr val="dk1"/>
+          </a:fontRef>
+        </p:style>
+        <p:txBody>
+          <a:bodyPr rtlCol="0" anchor="ctr"/>
+          <a:lstStyle/>
+          <a:p>
+            <a:pPr algn="ctr"/>
+            <a:r>
+              <a:rPr lang="en-CA" sz="900" dirty="0"/>
+              <a:t>Excel</a:t>
+            </a:r>
+          </a:p>
+        </p:txBody>
+      </p:sp>
+      <p:cxnSp>
+        <p:nvCxnSpPr>
+          <p:cNvPr id="111" name="Connector: Elbow 110">
+            <a:extLst>
+              <a:ext uri="{FF2B5EF4-FFF2-40B4-BE49-F238E27FC236}">
+                <a16:creationId xmlns:a16="http://schemas.microsoft.com/office/drawing/2014/main" id="{319692DC-E0A1-82E7-3E25-124A575126D6}"/>
+              </a:ext>
+            </a:extLst>
+          </p:cNvPr>
+          <p:cNvCxnSpPr>
+            <a:cxnSpLocks/>
+            <a:endCxn id="3" idx="1"/>
+          </p:cNvCxnSpPr>
+          <p:nvPr/>
+        </p:nvCxnSpPr>
+        <p:spPr>
+          <a:xfrm rot="5400000" flipH="1" flipV="1">
+            <a:off x="7670007" y="3035840"/>
+            <a:ext cx="2202209" cy="279847"/>
+          </a:xfrm>
+          <a:prstGeom prst="bentConnector2">
+            <a:avLst/>
+          </a:prstGeom>
+          <a:ln>
+            <a:tailEnd type="triangle"/>
+          </a:ln>
+        </p:spPr>
+        <p:style>
+          <a:lnRef idx="1">
+            <a:schemeClr val="accent1"/>
+          </a:lnRef>
+          <a:fillRef idx="0">
+            <a:schemeClr val="accent1"/>
+          </a:fillRef>
+          <a:effectRef idx="0">
+            <a:schemeClr val="accent1"/>
+          </a:effectRef>
+          <a:fontRef idx="minor">
+            <a:schemeClr val="tx1"/>
+          </a:fontRef>
+        </p:style>
+      </p:cxnSp>
+      <p:sp>
+        <p:nvSpPr>
+          <p:cNvPr id="127" name="Flowchart: Predefined Process 126">
+            <a:extLst>
+              <a:ext uri="{FF2B5EF4-FFF2-40B4-BE49-F238E27FC236}">
+                <a16:creationId xmlns:a16="http://schemas.microsoft.com/office/drawing/2014/main" id="{7EABB4BE-F753-E0CE-5A3D-C9324CD6B304}"/>
+              </a:ext>
+            </a:extLst>
+          </p:cNvPr>
+          <p:cNvSpPr/>
+          <p:nvPr/>
+        </p:nvSpPr>
+        <p:spPr>
+          <a:xfrm>
+            <a:off x="8926013" y="4851324"/>
+            <a:ext cx="1564380" cy="241353"/>
+          </a:xfrm>
+          <a:prstGeom prst="flowChartPredefinedProcess">
+            <a:avLst/>
+          </a:prstGeom>
+        </p:spPr>
+        <p:style>
+          <a:lnRef idx="1">
+            <a:schemeClr val="accent1"/>
+          </a:lnRef>
+          <a:fillRef idx="2">
+            <a:schemeClr val="accent1"/>
+          </a:fillRef>
+          <a:effectRef idx="1">
+            <a:schemeClr val="accent1"/>
+          </a:effectRef>
+          <a:fontRef idx="minor">
+            <a:schemeClr val="dk1"/>
+          </a:fontRef>
+        </p:style>
+        <p:txBody>
+          <a:bodyPr rtlCol="0" anchor="ctr"/>
+          <a:lstStyle/>
+          <a:p>
+            <a:pPr algn="ctr"/>
+            <a:r>
+              <a:rPr lang="en-CA" sz="900" dirty="0"/>
+              <a:t>…</a:t>
+            </a:r>
+          </a:p>
+        </p:txBody>
+      </p:sp>
+      <p:cxnSp>
+        <p:nvCxnSpPr>
+          <p:cNvPr id="128" name="Connector: Elbow 127">
+            <a:extLst>
+              <a:ext uri="{FF2B5EF4-FFF2-40B4-BE49-F238E27FC236}">
+                <a16:creationId xmlns:a16="http://schemas.microsoft.com/office/drawing/2014/main" id="{F3BD4C65-1E5E-3294-D71D-2E550FAECC4D}"/>
+              </a:ext>
+            </a:extLst>
+          </p:cNvPr>
+          <p:cNvCxnSpPr>
+            <a:cxnSpLocks/>
+            <a:stCxn id="140" idx="4"/>
+            <a:endCxn id="109" idx="1"/>
+          </p:cNvCxnSpPr>
+          <p:nvPr/>
+        </p:nvCxnSpPr>
+        <p:spPr>
+          <a:xfrm>
+            <a:off x="8129329" y="4255729"/>
+            <a:ext cx="797566" cy="415872"/>
+          </a:xfrm>
+          <a:prstGeom prst="bentConnector3">
+            <a:avLst>
+              <a:gd name="adj1" fmla="val 62592"/>
+            </a:avLst>
+          </a:prstGeom>
+          <a:ln>
+            <a:tailEnd type="triangle"/>
+          </a:ln>
+        </p:spPr>
+        <p:style>
+          <a:lnRef idx="1">
+            <a:schemeClr val="accent1"/>
+          </a:lnRef>
+          <a:fillRef idx="0">
+            <a:schemeClr val="accent1"/>
+          </a:fillRef>
+          <a:effectRef idx="0">
+            <a:schemeClr val="accent1"/>
+          </a:effectRef>
+          <a:fontRef idx="minor">
+            <a:schemeClr val="tx1"/>
+          </a:fontRef>
+        </p:style>
+      </p:cxnSp>
+      <p:cxnSp>
+        <p:nvCxnSpPr>
+          <p:cNvPr id="135" name="Connector: Elbow 134">
+            <a:extLst>
+              <a:ext uri="{FF2B5EF4-FFF2-40B4-BE49-F238E27FC236}">
+                <a16:creationId xmlns:a16="http://schemas.microsoft.com/office/drawing/2014/main" id="{BA190AAE-F9C5-18A8-6A26-D4BC1C299FA8}"/>
+              </a:ext>
+            </a:extLst>
+          </p:cNvPr>
+          <p:cNvCxnSpPr>
+            <a:cxnSpLocks/>
+            <a:stCxn id="140" idx="4"/>
+            <a:endCxn id="127" idx="1"/>
+          </p:cNvCxnSpPr>
+          <p:nvPr/>
+        </p:nvCxnSpPr>
+        <p:spPr>
+          <a:xfrm>
+            <a:off x="8129329" y="4255729"/>
+            <a:ext cx="796684" cy="716272"/>
+          </a:xfrm>
+          <a:prstGeom prst="bentConnector3">
+            <a:avLst>
+              <a:gd name="adj1" fmla="val 63269"/>
+            </a:avLst>
+          </a:prstGeom>
+          <a:ln>
+            <a:tailEnd type="triangle"/>
+          </a:ln>
+        </p:spPr>
+        <p:style>
+          <a:lnRef idx="1">
+            <a:schemeClr val="accent1"/>
+          </a:lnRef>
+          <a:fillRef idx="0">
+            <a:schemeClr val="accent1"/>
+          </a:fillRef>
+          <a:effectRef idx="0">
+            <a:schemeClr val="accent1"/>
+          </a:effectRef>
+          <a:fontRef idx="minor">
+            <a:schemeClr val="tx1"/>
+          </a:fontRef>
+        </p:style>
+      </p:cxnSp>
+      <p:sp>
+        <p:nvSpPr>
+          <p:cNvPr id="172" name="Flowchart: Predefined Process 171">
+            <a:extLst>
+              <a:ext uri="{FF2B5EF4-FFF2-40B4-BE49-F238E27FC236}">
+                <a16:creationId xmlns:a16="http://schemas.microsoft.com/office/drawing/2014/main" id="{961A7FF5-68F4-DBF8-A3B0-41E011C33621}"/>
+              </a:ext>
+            </a:extLst>
+          </p:cNvPr>
+          <p:cNvSpPr/>
+          <p:nvPr/>
+        </p:nvSpPr>
+        <p:spPr>
+          <a:xfrm>
+            <a:off x="10720315" y="2092212"/>
+            <a:ext cx="1431894" cy="308274"/>
+          </a:xfrm>
+          <a:prstGeom prst="flowChartPredefinedProcess">
+            <a:avLst/>
+          </a:prstGeom>
+          <a:solidFill>
+            <a:schemeClr val="accent5">
+              <a:lumMod val="50000"/>
+            </a:schemeClr>
+          </a:solidFill>
+        </p:spPr>
+        <p:style>
+          <a:lnRef idx="0">
+            <a:schemeClr val="accent5"/>
+          </a:lnRef>
+          <a:fillRef idx="3">
+            <a:schemeClr val="accent5"/>
+          </a:fillRef>
+          <a:effectRef idx="3">
+            <a:schemeClr val="accent5"/>
+          </a:effectRef>
+          <a:fontRef idx="minor">
+            <a:schemeClr val="lt1"/>
+          </a:fontRef>
+        </p:style>
+        <p:txBody>
+          <a:bodyPr rtlCol="0" anchor="ctr"/>
+          <a:lstStyle/>
+          <a:p>
+            <a:pPr algn="ctr"/>
+            <a:r>
+              <a:rPr lang="en-US" sz="900" dirty="0"/>
+              <a:t>Predictive Systems</a:t>
+            </a:r>
+            <a:endParaRPr lang="en-CA" sz="900" dirty="0"/>
+          </a:p>
+        </p:txBody>
+      </p:sp>
+      <p:cxnSp>
+        <p:nvCxnSpPr>
+          <p:cNvPr id="173" name="Connector: Elbow 172">
+            <a:extLst>
+              <a:ext uri="{FF2B5EF4-FFF2-40B4-BE49-F238E27FC236}">
+                <a16:creationId xmlns:a16="http://schemas.microsoft.com/office/drawing/2014/main" id="{799C60D2-5365-3ABF-45A0-930C33455BCC}"/>
+              </a:ext>
+            </a:extLst>
+          </p:cNvPr>
+          <p:cNvCxnSpPr>
+            <a:cxnSpLocks/>
+            <a:stCxn id="3" idx="3"/>
+            <a:endCxn id="172" idx="1"/>
+          </p:cNvCxnSpPr>
+          <p:nvPr/>
+        </p:nvCxnSpPr>
+        <p:spPr>
+          <a:xfrm>
+            <a:off x="10487184" y="2074658"/>
+            <a:ext cx="233131" cy="171691"/>
+          </a:xfrm>
+          <a:prstGeom prst="bentConnector3">
+            <a:avLst>
+              <a:gd name="adj1" fmla="val 50000"/>
+            </a:avLst>
+          </a:prstGeom>
+          <a:ln>
+            <a:tailEnd type="triangle"/>
+          </a:ln>
+        </p:spPr>
+        <p:style>
+          <a:lnRef idx="1">
+            <a:schemeClr val="accent1"/>
+          </a:lnRef>
+          <a:fillRef idx="0">
+            <a:schemeClr val="accent1"/>
+          </a:fillRef>
+          <a:effectRef idx="0">
+            <a:schemeClr val="accent1"/>
+          </a:effectRef>
+          <a:fontRef idx="minor">
+            <a:schemeClr val="tx1"/>
+          </a:fontRef>
+        </p:style>
+      </p:cxnSp>
+      <p:cxnSp>
+        <p:nvCxnSpPr>
+          <p:cNvPr id="180" name="Connector: Elbow 179">
+            <a:extLst>
+              <a:ext uri="{FF2B5EF4-FFF2-40B4-BE49-F238E27FC236}">
+                <a16:creationId xmlns:a16="http://schemas.microsoft.com/office/drawing/2014/main" id="{E67EB1D0-8392-A8BE-798E-20C57D4D9198}"/>
+              </a:ext>
+            </a:extLst>
+          </p:cNvPr>
+          <p:cNvCxnSpPr>
+            <a:cxnSpLocks/>
+            <a:stCxn id="9" idx="3"/>
+            <a:endCxn id="172" idx="1"/>
+          </p:cNvCxnSpPr>
+          <p:nvPr/>
+        </p:nvCxnSpPr>
+        <p:spPr>
+          <a:xfrm flipV="1">
+            <a:off x="10483095" y="2246349"/>
+            <a:ext cx="237220" cy="204644"/>
+          </a:xfrm>
+          <a:prstGeom prst="bentConnector3">
+            <a:avLst>
+              <a:gd name="adj1" fmla="val 50000"/>
+            </a:avLst>
           </a:prstGeom>
           <a:ln>
             <a:tailEnd type="triangle"/>

</xml_diff>